<commit_message>
Added tables in docx and pptx
</commit_message>
<xml_diff>
--- a/tests/data/ppt/find command.pptx
+++ b/tests/data/ppt/find command.pptx
@@ -16,6 +16,7 @@
     <p:sldId id="263" r:id="rId11"/>
     <p:sldId id="264" r:id="rId12"/>
     <p:sldId id="265" r:id="rId13"/>
+    <p:sldId id="266" r:id="rId14"/>
   </p:sldIdLst>
   <p:sldSz cx="12192000" cy="6858000"/>
   <p:notesSz cx="7559675" cy="10691813"/>
@@ -46,7 +47,7 @@
             <a:spLocks noGrp="1"/>
           </p:cNvSpPr>
           <p:nvPr>
-            <p:ph type="ftr" idx="2"/>
+            <p:ph type="ftr" idx="1"/>
           </p:nvPr>
         </p:nvSpPr>
         <p:spPr/>
@@ -66,14 +67,14 @@
             <a:spLocks noGrp="1"/>
           </p:cNvSpPr>
           <p:nvPr>
-            <p:ph type="sldNum" idx="3"/>
+            <p:ph type="sldNum" idx="2"/>
           </p:nvPr>
         </p:nvSpPr>
         <p:spPr/>
         <p:txBody>
           <a:bodyPr/>
           <a:p>
-            <a:fld id="{E1C209C0-F19E-43F0-ADE7-6FFF5686F294}" type="slidenum">
+            <a:fld id="{83965C23-4833-45E0-93B1-C216970CE4CF}" type="slidenum">
               <a:t>&lt;#&gt;</a:t>
             </a:fld>
           </a:p>
@@ -86,7 +87,7 @@
             <a:spLocks noGrp="1"/>
           </p:cNvSpPr>
           <p:nvPr>
-            <p:ph type="dt" idx="1"/>
+            <p:ph type="dt" idx="3"/>
           </p:nvPr>
         </p:nvSpPr>
         <p:spPr/>
@@ -150,11 +151,11 @@
             <a:noAutofit/>
           </a:bodyPr>
           <a:p>
-            <a:endParaRPr b="0" lang="en-US" sz="1800" spc="-1" strike="noStrike">
-              <a:solidFill>
-                <a:srgbClr val="000000"/>
-              </a:solidFill>
-              <a:latin typeface="Calibri"/>
+            <a:pPr algn="ctr">
+              <a:buNone/>
+            </a:pPr>
+            <a:endParaRPr b="0" lang="en-IN" sz="4400" spc="-1" strike="noStrike">
+              <a:latin typeface="Arial"/>
             </a:endParaRPr>
           </a:p>
         </p:txBody>
@@ -187,20 +188,8 @@
             <a:normAutofit/>
           </a:bodyPr>
           <a:p>
-            <a:pPr>
-              <a:lnSpc>
-                <a:spcPct val="90000"/>
-              </a:lnSpc>
-              <a:spcBef>
-                <a:spcPts val="1417"/>
-              </a:spcBef>
-              <a:buNone/>
-            </a:pPr>
-            <a:endParaRPr b="0" lang="en-US" sz="2800" spc="-1" strike="noStrike">
-              <a:solidFill>
-                <a:srgbClr val="000000"/>
-              </a:solidFill>
-              <a:latin typeface="Calibri"/>
+            <a:endParaRPr b="0" lang="en-IN" sz="3200" spc="-1" strike="noStrike">
+              <a:latin typeface="Arial"/>
             </a:endParaRPr>
           </a:p>
         </p:txBody>
@@ -233,20 +222,8 @@
             <a:normAutofit/>
           </a:bodyPr>
           <a:p>
-            <a:pPr>
-              <a:lnSpc>
-                <a:spcPct val="90000"/>
-              </a:lnSpc>
-              <a:spcBef>
-                <a:spcPts val="1417"/>
-              </a:spcBef>
-              <a:buNone/>
-            </a:pPr>
-            <a:endParaRPr b="0" lang="en-US" sz="2800" spc="-1" strike="noStrike">
-              <a:solidFill>
-                <a:srgbClr val="000000"/>
-              </a:solidFill>
-              <a:latin typeface="Calibri"/>
+            <a:endParaRPr b="0" lang="en-IN" sz="3200" spc="-1" strike="noStrike">
+              <a:latin typeface="Arial"/>
             </a:endParaRPr>
           </a:p>
         </p:txBody>
@@ -258,7 +235,7 @@
             <a:spLocks noGrp="1"/>
           </p:cNvSpPr>
           <p:nvPr>
-            <p:ph type="ftr" idx="2"/>
+            <p:ph type="ftr" idx="1"/>
           </p:nvPr>
         </p:nvSpPr>
         <p:spPr/>
@@ -278,14 +255,14 @@
             <a:spLocks noGrp="1"/>
           </p:cNvSpPr>
           <p:nvPr>
-            <p:ph type="sldNum" idx="3"/>
+            <p:ph type="sldNum" idx="2"/>
           </p:nvPr>
         </p:nvSpPr>
         <p:spPr/>
         <p:txBody>
           <a:bodyPr/>
           <a:p>
-            <a:fld id="{0927DD52-2996-45CD-B25D-3D91A70AE453}" type="slidenum">
+            <a:fld id="{44FE5D2A-4FA9-49A3-8D45-64E9DB8DA126}" type="slidenum">
               <a:t>&lt;#&gt;</a:t>
             </a:fld>
           </a:p>
@@ -298,7 +275,7 @@
             <a:spLocks noGrp="1"/>
           </p:cNvSpPr>
           <p:nvPr>
-            <p:ph type="dt" idx="1"/>
+            <p:ph type="dt" idx="3"/>
           </p:nvPr>
         </p:nvSpPr>
         <p:spPr/>
@@ -362,11 +339,11 @@
             <a:noAutofit/>
           </a:bodyPr>
           <a:p>
-            <a:endParaRPr b="0" lang="en-US" sz="1800" spc="-1" strike="noStrike">
-              <a:solidFill>
-                <a:srgbClr val="000000"/>
-              </a:solidFill>
-              <a:latin typeface="Calibri"/>
+            <a:pPr algn="ctr">
+              <a:buNone/>
+            </a:pPr>
+            <a:endParaRPr b="0" lang="en-IN" sz="4400" spc="-1" strike="noStrike">
+              <a:latin typeface="Arial"/>
             </a:endParaRPr>
           </a:p>
         </p:txBody>
@@ -399,20 +376,8 @@
             <a:normAutofit/>
           </a:bodyPr>
           <a:p>
-            <a:pPr>
-              <a:lnSpc>
-                <a:spcPct val="90000"/>
-              </a:lnSpc>
-              <a:spcBef>
-                <a:spcPts val="1417"/>
-              </a:spcBef>
-              <a:buNone/>
-            </a:pPr>
-            <a:endParaRPr b="0" lang="en-US" sz="2800" spc="-1" strike="noStrike">
-              <a:solidFill>
-                <a:srgbClr val="000000"/>
-              </a:solidFill>
-              <a:latin typeface="Calibri"/>
+            <a:endParaRPr b="0" lang="en-IN" sz="3200" spc="-1" strike="noStrike">
+              <a:latin typeface="Arial"/>
             </a:endParaRPr>
           </a:p>
         </p:txBody>
@@ -445,20 +410,8 @@
             <a:normAutofit/>
           </a:bodyPr>
           <a:p>
-            <a:pPr>
-              <a:lnSpc>
-                <a:spcPct val="90000"/>
-              </a:lnSpc>
-              <a:spcBef>
-                <a:spcPts val="1417"/>
-              </a:spcBef>
-              <a:buNone/>
-            </a:pPr>
-            <a:endParaRPr b="0" lang="en-US" sz="2800" spc="-1" strike="noStrike">
-              <a:solidFill>
-                <a:srgbClr val="000000"/>
-              </a:solidFill>
-              <a:latin typeface="Calibri"/>
+            <a:endParaRPr b="0" lang="en-IN" sz="3200" spc="-1" strike="noStrike">
+              <a:latin typeface="Arial"/>
             </a:endParaRPr>
           </a:p>
         </p:txBody>
@@ -491,20 +444,8 @@
             <a:normAutofit/>
           </a:bodyPr>
           <a:p>
-            <a:pPr>
-              <a:lnSpc>
-                <a:spcPct val="90000"/>
-              </a:lnSpc>
-              <a:spcBef>
-                <a:spcPts val="1417"/>
-              </a:spcBef>
-              <a:buNone/>
-            </a:pPr>
-            <a:endParaRPr b="0" lang="en-US" sz="2800" spc="-1" strike="noStrike">
-              <a:solidFill>
-                <a:srgbClr val="000000"/>
-              </a:solidFill>
-              <a:latin typeface="Calibri"/>
+            <a:endParaRPr b="0" lang="en-IN" sz="3200" spc="-1" strike="noStrike">
+              <a:latin typeface="Arial"/>
             </a:endParaRPr>
           </a:p>
         </p:txBody>
@@ -537,20 +478,8 @@
             <a:normAutofit/>
           </a:bodyPr>
           <a:p>
-            <a:pPr>
-              <a:lnSpc>
-                <a:spcPct val="90000"/>
-              </a:lnSpc>
-              <a:spcBef>
-                <a:spcPts val="1417"/>
-              </a:spcBef>
-              <a:buNone/>
-            </a:pPr>
-            <a:endParaRPr b="0" lang="en-US" sz="2800" spc="-1" strike="noStrike">
-              <a:solidFill>
-                <a:srgbClr val="000000"/>
-              </a:solidFill>
-              <a:latin typeface="Calibri"/>
+            <a:endParaRPr b="0" lang="en-IN" sz="3200" spc="-1" strike="noStrike">
+              <a:latin typeface="Arial"/>
             </a:endParaRPr>
           </a:p>
         </p:txBody>
@@ -562,7 +491,7 @@
             <a:spLocks noGrp="1"/>
           </p:cNvSpPr>
           <p:nvPr>
-            <p:ph type="ftr" idx="2"/>
+            <p:ph type="ftr" idx="1"/>
           </p:nvPr>
         </p:nvSpPr>
         <p:spPr/>
@@ -582,14 +511,14 @@
             <a:spLocks noGrp="1"/>
           </p:cNvSpPr>
           <p:nvPr>
-            <p:ph type="sldNum" idx="3"/>
+            <p:ph type="sldNum" idx="2"/>
           </p:nvPr>
         </p:nvSpPr>
         <p:spPr/>
         <p:txBody>
           <a:bodyPr/>
           <a:p>
-            <a:fld id="{16B50F60-6D7E-40F4-8F24-EA6A2347B9AC}" type="slidenum">
+            <a:fld id="{419B194E-2928-4756-965F-1D9762DCCD28}" type="slidenum">
               <a:t>&lt;#&gt;</a:t>
             </a:fld>
           </a:p>
@@ -602,7 +531,7 @@
             <a:spLocks noGrp="1"/>
           </p:cNvSpPr>
           <p:nvPr>
-            <p:ph type="dt" idx="1"/>
+            <p:ph type="dt" idx="3"/>
           </p:nvPr>
         </p:nvSpPr>
         <p:spPr/>
@@ -666,11 +595,11 @@
             <a:noAutofit/>
           </a:bodyPr>
           <a:p>
-            <a:endParaRPr b="0" lang="en-US" sz="1800" spc="-1" strike="noStrike">
-              <a:solidFill>
-                <a:srgbClr val="000000"/>
-              </a:solidFill>
-              <a:latin typeface="Calibri"/>
+            <a:pPr algn="ctr">
+              <a:buNone/>
+            </a:pPr>
+            <a:endParaRPr b="0" lang="en-IN" sz="4400" spc="-1" strike="noStrike">
+              <a:latin typeface="Arial"/>
             </a:endParaRPr>
           </a:p>
         </p:txBody>
@@ -703,20 +632,8 @@
             <a:normAutofit/>
           </a:bodyPr>
           <a:p>
-            <a:pPr>
-              <a:lnSpc>
-                <a:spcPct val="90000"/>
-              </a:lnSpc>
-              <a:spcBef>
-                <a:spcPts val="1417"/>
-              </a:spcBef>
-              <a:buNone/>
-            </a:pPr>
-            <a:endParaRPr b="0" lang="en-US" sz="2800" spc="-1" strike="noStrike">
-              <a:solidFill>
-                <a:srgbClr val="000000"/>
-              </a:solidFill>
-              <a:latin typeface="Calibri"/>
+            <a:endParaRPr b="0" lang="en-IN" sz="3200" spc="-1" strike="noStrike">
+              <a:latin typeface="Arial"/>
             </a:endParaRPr>
           </a:p>
         </p:txBody>
@@ -749,20 +666,8 @@
             <a:normAutofit/>
           </a:bodyPr>
           <a:p>
-            <a:pPr>
-              <a:lnSpc>
-                <a:spcPct val="90000"/>
-              </a:lnSpc>
-              <a:spcBef>
-                <a:spcPts val="1417"/>
-              </a:spcBef>
-              <a:buNone/>
-            </a:pPr>
-            <a:endParaRPr b="0" lang="en-US" sz="2800" spc="-1" strike="noStrike">
-              <a:solidFill>
-                <a:srgbClr val="000000"/>
-              </a:solidFill>
-              <a:latin typeface="Calibri"/>
+            <a:endParaRPr b="0" lang="en-IN" sz="3200" spc="-1" strike="noStrike">
+              <a:latin typeface="Arial"/>
             </a:endParaRPr>
           </a:p>
         </p:txBody>
@@ -795,20 +700,8 @@
             <a:normAutofit/>
           </a:bodyPr>
           <a:p>
-            <a:pPr>
-              <a:lnSpc>
-                <a:spcPct val="90000"/>
-              </a:lnSpc>
-              <a:spcBef>
-                <a:spcPts val="1417"/>
-              </a:spcBef>
-              <a:buNone/>
-            </a:pPr>
-            <a:endParaRPr b="0" lang="en-US" sz="2800" spc="-1" strike="noStrike">
-              <a:solidFill>
-                <a:srgbClr val="000000"/>
-              </a:solidFill>
-              <a:latin typeface="Calibri"/>
+            <a:endParaRPr b="0" lang="en-IN" sz="3200" spc="-1" strike="noStrike">
+              <a:latin typeface="Arial"/>
             </a:endParaRPr>
           </a:p>
         </p:txBody>
@@ -841,20 +734,8 @@
             <a:normAutofit/>
           </a:bodyPr>
           <a:p>
-            <a:pPr>
-              <a:lnSpc>
-                <a:spcPct val="90000"/>
-              </a:lnSpc>
-              <a:spcBef>
-                <a:spcPts val="1417"/>
-              </a:spcBef>
-              <a:buNone/>
-            </a:pPr>
-            <a:endParaRPr b="0" lang="en-US" sz="2800" spc="-1" strike="noStrike">
-              <a:solidFill>
-                <a:srgbClr val="000000"/>
-              </a:solidFill>
-              <a:latin typeface="Calibri"/>
+            <a:endParaRPr b="0" lang="en-IN" sz="3200" spc="-1" strike="noStrike">
+              <a:latin typeface="Arial"/>
             </a:endParaRPr>
           </a:p>
         </p:txBody>
@@ -887,20 +768,8 @@
             <a:normAutofit/>
           </a:bodyPr>
           <a:p>
-            <a:pPr>
-              <a:lnSpc>
-                <a:spcPct val="90000"/>
-              </a:lnSpc>
-              <a:spcBef>
-                <a:spcPts val="1417"/>
-              </a:spcBef>
-              <a:buNone/>
-            </a:pPr>
-            <a:endParaRPr b="0" lang="en-US" sz="2800" spc="-1" strike="noStrike">
-              <a:solidFill>
-                <a:srgbClr val="000000"/>
-              </a:solidFill>
-              <a:latin typeface="Calibri"/>
+            <a:endParaRPr b="0" lang="en-IN" sz="3200" spc="-1" strike="noStrike">
+              <a:latin typeface="Arial"/>
             </a:endParaRPr>
           </a:p>
         </p:txBody>
@@ -933,20 +802,8 @@
             <a:normAutofit/>
           </a:bodyPr>
           <a:p>
-            <a:pPr>
-              <a:lnSpc>
-                <a:spcPct val="90000"/>
-              </a:lnSpc>
-              <a:spcBef>
-                <a:spcPts val="1417"/>
-              </a:spcBef>
-              <a:buNone/>
-            </a:pPr>
-            <a:endParaRPr b="0" lang="en-US" sz="2800" spc="-1" strike="noStrike">
-              <a:solidFill>
-                <a:srgbClr val="000000"/>
-              </a:solidFill>
-              <a:latin typeface="Calibri"/>
+            <a:endParaRPr b="0" lang="en-IN" sz="3200" spc="-1" strike="noStrike">
+              <a:latin typeface="Arial"/>
             </a:endParaRPr>
           </a:p>
         </p:txBody>
@@ -958,7 +815,7 @@
             <a:spLocks noGrp="1"/>
           </p:cNvSpPr>
           <p:nvPr>
-            <p:ph type="ftr" idx="2"/>
+            <p:ph type="ftr" idx="1"/>
           </p:nvPr>
         </p:nvSpPr>
         <p:spPr/>
@@ -978,14 +835,14 @@
             <a:spLocks noGrp="1"/>
           </p:cNvSpPr>
           <p:nvPr>
-            <p:ph type="sldNum" idx="3"/>
+            <p:ph type="sldNum" idx="2"/>
           </p:nvPr>
         </p:nvSpPr>
         <p:spPr/>
         <p:txBody>
           <a:bodyPr/>
           <a:p>
-            <a:fld id="{F45D67B0-DA9F-4BDD-A5D1-9BD80BB359FB}" type="slidenum">
+            <a:fld id="{DBE9707B-5116-4DAF-9884-8BE2B54520B4}" type="slidenum">
               <a:t>&lt;#&gt;</a:t>
             </a:fld>
           </a:p>
@@ -998,7 +855,7 @@
             <a:spLocks noGrp="1"/>
           </p:cNvSpPr>
           <p:nvPr>
-            <p:ph type="dt" idx="1"/>
+            <p:ph type="dt" idx="3"/>
           </p:nvPr>
         </p:nvSpPr>
         <p:spPr/>
@@ -1041,7 +898,7 @@
             <a:spLocks noGrp="1"/>
           </p:cNvSpPr>
           <p:nvPr>
-            <p:ph type="ftr" idx="5"/>
+            <p:ph type="ftr" idx="4"/>
           </p:nvPr>
         </p:nvSpPr>
         <p:spPr/>
@@ -1061,14 +918,14 @@
             <a:spLocks noGrp="1"/>
           </p:cNvSpPr>
           <p:nvPr>
-            <p:ph type="sldNum" idx="6"/>
+            <p:ph type="sldNum" idx="5"/>
           </p:nvPr>
         </p:nvSpPr>
         <p:spPr/>
         <p:txBody>
           <a:bodyPr/>
           <a:p>
-            <a:fld id="{600593C3-E073-4C5C-BBB1-13B4D15B71D3}" type="slidenum">
+            <a:fld id="{4FCAB303-44EE-406E-AC3B-1C001A2C62A4}" type="slidenum">
               <a:t>&lt;#&gt;</a:t>
             </a:fld>
           </a:p>
@@ -1081,7 +938,7 @@
             <a:spLocks noGrp="1"/>
           </p:cNvSpPr>
           <p:nvPr>
-            <p:ph type="dt" idx="4"/>
+            <p:ph type="dt" idx="6"/>
           </p:nvPr>
         </p:nvSpPr>
         <p:spPr/>
@@ -1145,11 +1002,11 @@
             <a:noAutofit/>
           </a:bodyPr>
           <a:p>
-            <a:endParaRPr b="0" lang="en-US" sz="1800" spc="-1" strike="noStrike">
-              <a:solidFill>
-                <a:srgbClr val="000000"/>
-              </a:solidFill>
-              <a:latin typeface="Calibri"/>
+            <a:pPr algn="ctr">
+              <a:buNone/>
+            </a:pPr>
+            <a:endParaRPr b="0" lang="en-IN" sz="4400" spc="-1" strike="noStrike">
+              <a:latin typeface="Arial"/>
             </a:endParaRPr>
           </a:p>
         </p:txBody>
@@ -1198,7 +1055,7 @@
             <a:spLocks noGrp="1"/>
           </p:cNvSpPr>
           <p:nvPr>
-            <p:ph type="ftr" idx="5"/>
+            <p:ph type="ftr" idx="4"/>
           </p:nvPr>
         </p:nvSpPr>
         <p:spPr/>
@@ -1218,14 +1075,14 @@
             <a:spLocks noGrp="1"/>
           </p:cNvSpPr>
           <p:nvPr>
-            <p:ph type="sldNum" idx="6"/>
+            <p:ph type="sldNum" idx="5"/>
           </p:nvPr>
         </p:nvSpPr>
         <p:spPr/>
         <p:txBody>
           <a:bodyPr/>
           <a:p>
-            <a:fld id="{102834EF-9E73-4BAC-8F83-07F14DC29F0A}" type="slidenum">
+            <a:fld id="{36D3A75F-5B9F-4253-9CF1-1EA53688C6FB}" type="slidenum">
               <a:t>&lt;#&gt;</a:t>
             </a:fld>
           </a:p>
@@ -1238,7 +1095,7 @@
             <a:spLocks noGrp="1"/>
           </p:cNvSpPr>
           <p:nvPr>
-            <p:ph type="dt" idx="4"/>
+            <p:ph type="dt" idx="6"/>
           </p:nvPr>
         </p:nvSpPr>
         <p:spPr/>
@@ -1302,11 +1159,11 @@
             <a:noAutofit/>
           </a:bodyPr>
           <a:p>
-            <a:endParaRPr b="0" lang="en-US" sz="1800" spc="-1" strike="noStrike">
-              <a:solidFill>
-                <a:srgbClr val="000000"/>
-              </a:solidFill>
-              <a:latin typeface="Calibri"/>
+            <a:pPr algn="ctr">
+              <a:buNone/>
+            </a:pPr>
+            <a:endParaRPr b="0" lang="en-IN" sz="4400" spc="-1" strike="noStrike">
+              <a:latin typeface="Arial"/>
             </a:endParaRPr>
           </a:p>
         </p:txBody>
@@ -1339,20 +1196,8 @@
             <a:normAutofit/>
           </a:bodyPr>
           <a:p>
-            <a:pPr>
-              <a:lnSpc>
-                <a:spcPct val="90000"/>
-              </a:lnSpc>
-              <a:spcBef>
-                <a:spcPts val="1417"/>
-              </a:spcBef>
-              <a:buNone/>
-            </a:pPr>
-            <a:endParaRPr b="0" lang="en-US" sz="2800" spc="-1" strike="noStrike">
-              <a:solidFill>
-                <a:srgbClr val="000000"/>
-              </a:solidFill>
-              <a:latin typeface="Calibri"/>
+            <a:endParaRPr b="0" lang="en-IN" sz="3200" spc="-1" strike="noStrike">
+              <a:latin typeface="Arial"/>
             </a:endParaRPr>
           </a:p>
         </p:txBody>
@@ -1364,7 +1209,7 @@
             <a:spLocks noGrp="1"/>
           </p:cNvSpPr>
           <p:nvPr>
-            <p:ph type="ftr" idx="5"/>
+            <p:ph type="ftr" idx="4"/>
           </p:nvPr>
         </p:nvSpPr>
         <p:spPr/>
@@ -1384,14 +1229,14 @@
             <a:spLocks noGrp="1"/>
           </p:cNvSpPr>
           <p:nvPr>
-            <p:ph type="sldNum" idx="6"/>
+            <p:ph type="sldNum" idx="5"/>
           </p:nvPr>
         </p:nvSpPr>
         <p:spPr/>
         <p:txBody>
           <a:bodyPr/>
           <a:p>
-            <a:fld id="{33076CFE-DCF0-4BD5-9356-2733B55F466C}" type="slidenum">
+            <a:fld id="{7AEEC75E-6464-4940-8A69-6B3C3354E009}" type="slidenum">
               <a:t>&lt;#&gt;</a:t>
             </a:fld>
           </a:p>
@@ -1404,7 +1249,7 @@
             <a:spLocks noGrp="1"/>
           </p:cNvSpPr>
           <p:nvPr>
-            <p:ph type="dt" idx="4"/>
+            <p:ph type="dt" idx="6"/>
           </p:nvPr>
         </p:nvSpPr>
         <p:spPr/>
@@ -1468,11 +1313,11 @@
             <a:noAutofit/>
           </a:bodyPr>
           <a:p>
-            <a:endParaRPr b="0" lang="en-US" sz="1800" spc="-1" strike="noStrike">
-              <a:solidFill>
-                <a:srgbClr val="000000"/>
-              </a:solidFill>
-              <a:latin typeface="Calibri"/>
+            <a:pPr algn="ctr">
+              <a:buNone/>
+            </a:pPr>
+            <a:endParaRPr b="0" lang="en-IN" sz="4400" spc="-1" strike="noStrike">
+              <a:latin typeface="Arial"/>
             </a:endParaRPr>
           </a:p>
         </p:txBody>
@@ -1505,20 +1350,8 @@
             <a:normAutofit/>
           </a:bodyPr>
           <a:p>
-            <a:pPr>
-              <a:lnSpc>
-                <a:spcPct val="90000"/>
-              </a:lnSpc>
-              <a:spcBef>
-                <a:spcPts val="1417"/>
-              </a:spcBef>
-              <a:buNone/>
-            </a:pPr>
-            <a:endParaRPr b="0" lang="en-US" sz="2800" spc="-1" strike="noStrike">
-              <a:solidFill>
-                <a:srgbClr val="000000"/>
-              </a:solidFill>
-              <a:latin typeface="Calibri"/>
+            <a:endParaRPr b="0" lang="en-IN" sz="3200" spc="-1" strike="noStrike">
+              <a:latin typeface="Arial"/>
             </a:endParaRPr>
           </a:p>
         </p:txBody>
@@ -1551,20 +1384,8 @@
             <a:normAutofit/>
           </a:bodyPr>
           <a:p>
-            <a:pPr>
-              <a:lnSpc>
-                <a:spcPct val="90000"/>
-              </a:lnSpc>
-              <a:spcBef>
-                <a:spcPts val="1417"/>
-              </a:spcBef>
-              <a:buNone/>
-            </a:pPr>
-            <a:endParaRPr b="0" lang="en-US" sz="2800" spc="-1" strike="noStrike">
-              <a:solidFill>
-                <a:srgbClr val="000000"/>
-              </a:solidFill>
-              <a:latin typeface="Calibri"/>
+            <a:endParaRPr b="0" lang="en-IN" sz="3200" spc="-1" strike="noStrike">
+              <a:latin typeface="Arial"/>
             </a:endParaRPr>
           </a:p>
         </p:txBody>
@@ -1576,7 +1397,7 @@
             <a:spLocks noGrp="1"/>
           </p:cNvSpPr>
           <p:nvPr>
-            <p:ph type="ftr" idx="5"/>
+            <p:ph type="ftr" idx="4"/>
           </p:nvPr>
         </p:nvSpPr>
         <p:spPr/>
@@ -1596,14 +1417,14 @@
             <a:spLocks noGrp="1"/>
           </p:cNvSpPr>
           <p:nvPr>
-            <p:ph type="sldNum" idx="6"/>
+            <p:ph type="sldNum" idx="5"/>
           </p:nvPr>
         </p:nvSpPr>
         <p:spPr/>
         <p:txBody>
           <a:bodyPr/>
           <a:p>
-            <a:fld id="{87487C42-B62B-45E9-B56C-15DB73D71E8A}" type="slidenum">
+            <a:fld id="{43594ACE-D003-46B2-B39D-C9302F5464FF}" type="slidenum">
               <a:t>&lt;#&gt;</a:t>
             </a:fld>
           </a:p>
@@ -1616,7 +1437,7 @@
             <a:spLocks noGrp="1"/>
           </p:cNvSpPr>
           <p:nvPr>
-            <p:ph type="dt" idx="4"/>
+            <p:ph type="dt" idx="6"/>
           </p:nvPr>
         </p:nvSpPr>
         <p:spPr/>
@@ -1680,11 +1501,11 @@
             <a:noAutofit/>
           </a:bodyPr>
           <a:p>
-            <a:endParaRPr b="0" lang="en-US" sz="1800" spc="-1" strike="noStrike">
-              <a:solidFill>
-                <a:srgbClr val="000000"/>
-              </a:solidFill>
-              <a:latin typeface="Calibri"/>
+            <a:pPr algn="ctr">
+              <a:buNone/>
+            </a:pPr>
+            <a:endParaRPr b="0" lang="en-IN" sz="4400" spc="-1" strike="noStrike">
+              <a:latin typeface="Arial"/>
             </a:endParaRPr>
           </a:p>
         </p:txBody>
@@ -1696,7 +1517,7 @@
             <a:spLocks noGrp="1"/>
           </p:cNvSpPr>
           <p:nvPr>
-            <p:ph type="ftr" idx="5"/>
+            <p:ph type="ftr" idx="4"/>
           </p:nvPr>
         </p:nvSpPr>
         <p:spPr/>
@@ -1716,14 +1537,14 @@
             <a:spLocks noGrp="1"/>
           </p:cNvSpPr>
           <p:nvPr>
-            <p:ph type="sldNum" idx="6"/>
+            <p:ph type="sldNum" idx="5"/>
           </p:nvPr>
         </p:nvSpPr>
         <p:spPr/>
         <p:txBody>
           <a:bodyPr/>
           <a:p>
-            <a:fld id="{B888A0E6-4517-47E3-8BF7-3231D40138BC}" type="slidenum">
+            <a:fld id="{3F8AD8CF-4FD6-4306-B57F-BF51CAECD76A}" type="slidenum">
               <a:t>&lt;#&gt;</a:t>
             </a:fld>
           </a:p>
@@ -1736,7 +1557,7 @@
             <a:spLocks noGrp="1"/>
           </p:cNvSpPr>
           <p:nvPr>
-            <p:ph type="dt" idx="4"/>
+            <p:ph type="dt" idx="6"/>
           </p:nvPr>
         </p:nvSpPr>
         <p:spPr/>
@@ -1816,7 +1637,7 @@
             <a:spLocks noGrp="1"/>
           </p:cNvSpPr>
           <p:nvPr>
-            <p:ph type="ftr" idx="5"/>
+            <p:ph type="ftr" idx="4"/>
           </p:nvPr>
         </p:nvSpPr>
         <p:spPr/>
@@ -1836,14 +1657,14 @@
             <a:spLocks noGrp="1"/>
           </p:cNvSpPr>
           <p:nvPr>
-            <p:ph type="sldNum" idx="6"/>
+            <p:ph type="sldNum" idx="5"/>
           </p:nvPr>
         </p:nvSpPr>
         <p:spPr/>
         <p:txBody>
           <a:bodyPr/>
           <a:p>
-            <a:fld id="{F6E8C819-6A0C-402C-9DE5-77A9B5C05530}" type="slidenum">
+            <a:fld id="{0737430B-C9B6-4A68-A551-6FF6D2C31B21}" type="slidenum">
               <a:t>&lt;#&gt;</a:t>
             </a:fld>
           </a:p>
@@ -1856,7 +1677,7 @@
             <a:spLocks noGrp="1"/>
           </p:cNvSpPr>
           <p:nvPr>
-            <p:ph type="dt" idx="4"/>
+            <p:ph type="dt" idx="6"/>
           </p:nvPr>
         </p:nvSpPr>
         <p:spPr/>
@@ -1920,11 +1741,11 @@
             <a:noAutofit/>
           </a:bodyPr>
           <a:p>
-            <a:endParaRPr b="0" lang="en-US" sz="1800" spc="-1" strike="noStrike">
-              <a:solidFill>
-                <a:srgbClr val="000000"/>
-              </a:solidFill>
-              <a:latin typeface="Calibri"/>
+            <a:pPr algn="ctr">
+              <a:buNone/>
+            </a:pPr>
+            <a:endParaRPr b="0" lang="en-IN" sz="4400" spc="-1" strike="noStrike">
+              <a:latin typeface="Arial"/>
             </a:endParaRPr>
           </a:p>
         </p:txBody>
@@ -1957,20 +1778,8 @@
             <a:normAutofit/>
           </a:bodyPr>
           <a:p>
-            <a:pPr>
-              <a:lnSpc>
-                <a:spcPct val="90000"/>
-              </a:lnSpc>
-              <a:spcBef>
-                <a:spcPts val="1417"/>
-              </a:spcBef>
-              <a:buNone/>
-            </a:pPr>
-            <a:endParaRPr b="0" lang="en-US" sz="2800" spc="-1" strike="noStrike">
-              <a:solidFill>
-                <a:srgbClr val="000000"/>
-              </a:solidFill>
-              <a:latin typeface="Calibri"/>
+            <a:endParaRPr b="0" lang="en-IN" sz="3200" spc="-1" strike="noStrike">
+              <a:latin typeface="Arial"/>
             </a:endParaRPr>
           </a:p>
         </p:txBody>
@@ -2003,20 +1812,8 @@
             <a:normAutofit/>
           </a:bodyPr>
           <a:p>
-            <a:pPr>
-              <a:lnSpc>
-                <a:spcPct val="90000"/>
-              </a:lnSpc>
-              <a:spcBef>
-                <a:spcPts val="1417"/>
-              </a:spcBef>
-              <a:buNone/>
-            </a:pPr>
-            <a:endParaRPr b="0" lang="en-US" sz="2800" spc="-1" strike="noStrike">
-              <a:solidFill>
-                <a:srgbClr val="000000"/>
-              </a:solidFill>
-              <a:latin typeface="Calibri"/>
+            <a:endParaRPr b="0" lang="en-IN" sz="3200" spc="-1" strike="noStrike">
+              <a:latin typeface="Arial"/>
             </a:endParaRPr>
           </a:p>
         </p:txBody>
@@ -2049,20 +1846,8 @@
             <a:normAutofit/>
           </a:bodyPr>
           <a:p>
-            <a:pPr>
-              <a:lnSpc>
-                <a:spcPct val="90000"/>
-              </a:lnSpc>
-              <a:spcBef>
-                <a:spcPts val="1417"/>
-              </a:spcBef>
-              <a:buNone/>
-            </a:pPr>
-            <a:endParaRPr b="0" lang="en-US" sz="2800" spc="-1" strike="noStrike">
-              <a:solidFill>
-                <a:srgbClr val="000000"/>
-              </a:solidFill>
-              <a:latin typeface="Calibri"/>
+            <a:endParaRPr b="0" lang="en-IN" sz="3200" spc="-1" strike="noStrike">
+              <a:latin typeface="Arial"/>
             </a:endParaRPr>
           </a:p>
         </p:txBody>
@@ -2074,7 +1859,7 @@
             <a:spLocks noGrp="1"/>
           </p:cNvSpPr>
           <p:nvPr>
-            <p:ph type="ftr" idx="5"/>
+            <p:ph type="ftr" idx="4"/>
           </p:nvPr>
         </p:nvSpPr>
         <p:spPr/>
@@ -2094,14 +1879,14 @@
             <a:spLocks noGrp="1"/>
           </p:cNvSpPr>
           <p:nvPr>
-            <p:ph type="sldNum" idx="6"/>
+            <p:ph type="sldNum" idx="5"/>
           </p:nvPr>
         </p:nvSpPr>
         <p:spPr/>
         <p:txBody>
           <a:bodyPr/>
           <a:p>
-            <a:fld id="{F611680A-5BC7-4E74-A220-DCC366A4930A}" type="slidenum">
+            <a:fld id="{5E825587-9B05-4705-9613-42677E75C8CF}" type="slidenum">
               <a:t>&lt;#&gt;</a:t>
             </a:fld>
           </a:p>
@@ -2114,7 +1899,7 @@
             <a:spLocks noGrp="1"/>
           </p:cNvSpPr>
           <p:nvPr>
-            <p:ph type="dt" idx="4"/>
+            <p:ph type="dt" idx="6"/>
           </p:nvPr>
         </p:nvSpPr>
         <p:spPr/>
@@ -2178,11 +1963,11 @@
             <a:noAutofit/>
           </a:bodyPr>
           <a:p>
-            <a:endParaRPr b="0" lang="en-US" sz="1800" spc="-1" strike="noStrike">
-              <a:solidFill>
-                <a:srgbClr val="000000"/>
-              </a:solidFill>
-              <a:latin typeface="Calibri"/>
+            <a:pPr algn="ctr">
+              <a:buNone/>
+            </a:pPr>
+            <a:endParaRPr b="0" lang="en-IN" sz="4400" spc="-1" strike="noStrike">
+              <a:latin typeface="Arial"/>
             </a:endParaRPr>
           </a:p>
         </p:txBody>
@@ -2231,7 +2016,7 @@
             <a:spLocks noGrp="1"/>
           </p:cNvSpPr>
           <p:nvPr>
-            <p:ph type="ftr" idx="2"/>
+            <p:ph type="ftr" idx="1"/>
           </p:nvPr>
         </p:nvSpPr>
         <p:spPr/>
@@ -2251,14 +2036,14 @@
             <a:spLocks noGrp="1"/>
           </p:cNvSpPr>
           <p:nvPr>
-            <p:ph type="sldNum" idx="3"/>
+            <p:ph type="sldNum" idx="2"/>
           </p:nvPr>
         </p:nvSpPr>
         <p:spPr/>
         <p:txBody>
           <a:bodyPr/>
           <a:p>
-            <a:fld id="{7BAC737D-2430-4E6C-961B-085A10943B3C}" type="slidenum">
+            <a:fld id="{F6BD01A5-5E18-4EF3-9085-C04FFDEC7873}" type="slidenum">
               <a:t>&lt;#&gt;</a:t>
             </a:fld>
           </a:p>
@@ -2271,7 +2056,7 @@
             <a:spLocks noGrp="1"/>
           </p:cNvSpPr>
           <p:nvPr>
-            <p:ph type="dt" idx="1"/>
+            <p:ph type="dt" idx="3"/>
           </p:nvPr>
         </p:nvSpPr>
         <p:spPr/>
@@ -2335,11 +2120,11 @@
             <a:noAutofit/>
           </a:bodyPr>
           <a:p>
-            <a:endParaRPr b="0" lang="en-US" sz="1800" spc="-1" strike="noStrike">
-              <a:solidFill>
-                <a:srgbClr val="000000"/>
-              </a:solidFill>
-              <a:latin typeface="Calibri"/>
+            <a:pPr algn="ctr">
+              <a:buNone/>
+            </a:pPr>
+            <a:endParaRPr b="0" lang="en-IN" sz="4400" spc="-1" strike="noStrike">
+              <a:latin typeface="Arial"/>
             </a:endParaRPr>
           </a:p>
         </p:txBody>
@@ -2372,20 +2157,8 @@
             <a:normAutofit/>
           </a:bodyPr>
           <a:p>
-            <a:pPr>
-              <a:lnSpc>
-                <a:spcPct val="90000"/>
-              </a:lnSpc>
-              <a:spcBef>
-                <a:spcPts val="1417"/>
-              </a:spcBef>
-              <a:buNone/>
-            </a:pPr>
-            <a:endParaRPr b="0" lang="en-US" sz="2800" spc="-1" strike="noStrike">
-              <a:solidFill>
-                <a:srgbClr val="000000"/>
-              </a:solidFill>
-              <a:latin typeface="Calibri"/>
+            <a:endParaRPr b="0" lang="en-IN" sz="3200" spc="-1" strike="noStrike">
+              <a:latin typeface="Arial"/>
             </a:endParaRPr>
           </a:p>
         </p:txBody>
@@ -2418,20 +2191,8 @@
             <a:normAutofit/>
           </a:bodyPr>
           <a:p>
-            <a:pPr>
-              <a:lnSpc>
-                <a:spcPct val="90000"/>
-              </a:lnSpc>
-              <a:spcBef>
-                <a:spcPts val="1417"/>
-              </a:spcBef>
-              <a:buNone/>
-            </a:pPr>
-            <a:endParaRPr b="0" lang="en-US" sz="2800" spc="-1" strike="noStrike">
-              <a:solidFill>
-                <a:srgbClr val="000000"/>
-              </a:solidFill>
-              <a:latin typeface="Calibri"/>
+            <a:endParaRPr b="0" lang="en-IN" sz="3200" spc="-1" strike="noStrike">
+              <a:latin typeface="Arial"/>
             </a:endParaRPr>
           </a:p>
         </p:txBody>
@@ -2464,20 +2225,8 @@
             <a:normAutofit/>
           </a:bodyPr>
           <a:p>
-            <a:pPr>
-              <a:lnSpc>
-                <a:spcPct val="90000"/>
-              </a:lnSpc>
-              <a:spcBef>
-                <a:spcPts val="1417"/>
-              </a:spcBef>
-              <a:buNone/>
-            </a:pPr>
-            <a:endParaRPr b="0" lang="en-US" sz="2800" spc="-1" strike="noStrike">
-              <a:solidFill>
-                <a:srgbClr val="000000"/>
-              </a:solidFill>
-              <a:latin typeface="Calibri"/>
+            <a:endParaRPr b="0" lang="en-IN" sz="3200" spc="-1" strike="noStrike">
+              <a:latin typeface="Arial"/>
             </a:endParaRPr>
           </a:p>
         </p:txBody>
@@ -2489,7 +2238,7 @@
             <a:spLocks noGrp="1"/>
           </p:cNvSpPr>
           <p:nvPr>
-            <p:ph type="ftr" idx="5"/>
+            <p:ph type="ftr" idx="4"/>
           </p:nvPr>
         </p:nvSpPr>
         <p:spPr/>
@@ -2509,14 +2258,14 @@
             <a:spLocks noGrp="1"/>
           </p:cNvSpPr>
           <p:nvPr>
-            <p:ph type="sldNum" idx="6"/>
+            <p:ph type="sldNum" idx="5"/>
           </p:nvPr>
         </p:nvSpPr>
         <p:spPr/>
         <p:txBody>
           <a:bodyPr/>
           <a:p>
-            <a:fld id="{9C77FE34-8193-4FBC-8202-B8876D82924E}" type="slidenum">
+            <a:fld id="{780B1C76-BFF8-41DE-91F0-6D3865EC4CEA}" type="slidenum">
               <a:t>&lt;#&gt;</a:t>
             </a:fld>
           </a:p>
@@ -2529,7 +2278,7 @@
             <a:spLocks noGrp="1"/>
           </p:cNvSpPr>
           <p:nvPr>
-            <p:ph type="dt" idx="4"/>
+            <p:ph type="dt" idx="6"/>
           </p:nvPr>
         </p:nvSpPr>
         <p:spPr/>
@@ -2593,11 +2342,11 @@
             <a:noAutofit/>
           </a:bodyPr>
           <a:p>
-            <a:endParaRPr b="0" lang="en-US" sz="1800" spc="-1" strike="noStrike">
-              <a:solidFill>
-                <a:srgbClr val="000000"/>
-              </a:solidFill>
-              <a:latin typeface="Calibri"/>
+            <a:pPr algn="ctr">
+              <a:buNone/>
+            </a:pPr>
+            <a:endParaRPr b="0" lang="en-IN" sz="4400" spc="-1" strike="noStrike">
+              <a:latin typeface="Arial"/>
             </a:endParaRPr>
           </a:p>
         </p:txBody>
@@ -2630,20 +2379,8 @@
             <a:normAutofit/>
           </a:bodyPr>
           <a:p>
-            <a:pPr>
-              <a:lnSpc>
-                <a:spcPct val="90000"/>
-              </a:lnSpc>
-              <a:spcBef>
-                <a:spcPts val="1417"/>
-              </a:spcBef>
-              <a:buNone/>
-            </a:pPr>
-            <a:endParaRPr b="0" lang="en-US" sz="2800" spc="-1" strike="noStrike">
-              <a:solidFill>
-                <a:srgbClr val="000000"/>
-              </a:solidFill>
-              <a:latin typeface="Calibri"/>
+            <a:endParaRPr b="0" lang="en-IN" sz="3200" spc="-1" strike="noStrike">
+              <a:latin typeface="Arial"/>
             </a:endParaRPr>
           </a:p>
         </p:txBody>
@@ -2676,20 +2413,8 @@
             <a:normAutofit/>
           </a:bodyPr>
           <a:p>
-            <a:pPr>
-              <a:lnSpc>
-                <a:spcPct val="90000"/>
-              </a:lnSpc>
-              <a:spcBef>
-                <a:spcPts val="1417"/>
-              </a:spcBef>
-              <a:buNone/>
-            </a:pPr>
-            <a:endParaRPr b="0" lang="en-US" sz="2800" spc="-1" strike="noStrike">
-              <a:solidFill>
-                <a:srgbClr val="000000"/>
-              </a:solidFill>
-              <a:latin typeface="Calibri"/>
+            <a:endParaRPr b="0" lang="en-IN" sz="3200" spc="-1" strike="noStrike">
+              <a:latin typeface="Arial"/>
             </a:endParaRPr>
           </a:p>
         </p:txBody>
@@ -2722,20 +2447,8 @@
             <a:normAutofit/>
           </a:bodyPr>
           <a:p>
-            <a:pPr>
-              <a:lnSpc>
-                <a:spcPct val="90000"/>
-              </a:lnSpc>
-              <a:spcBef>
-                <a:spcPts val="1417"/>
-              </a:spcBef>
-              <a:buNone/>
-            </a:pPr>
-            <a:endParaRPr b="0" lang="en-US" sz="2800" spc="-1" strike="noStrike">
-              <a:solidFill>
-                <a:srgbClr val="000000"/>
-              </a:solidFill>
-              <a:latin typeface="Calibri"/>
+            <a:endParaRPr b="0" lang="en-IN" sz="3200" spc="-1" strike="noStrike">
+              <a:latin typeface="Arial"/>
             </a:endParaRPr>
           </a:p>
         </p:txBody>
@@ -2747,7 +2460,7 @@
             <a:spLocks noGrp="1"/>
           </p:cNvSpPr>
           <p:nvPr>
-            <p:ph type="ftr" idx="5"/>
+            <p:ph type="ftr" idx="4"/>
           </p:nvPr>
         </p:nvSpPr>
         <p:spPr/>
@@ -2767,14 +2480,14 @@
             <a:spLocks noGrp="1"/>
           </p:cNvSpPr>
           <p:nvPr>
-            <p:ph type="sldNum" idx="6"/>
+            <p:ph type="sldNum" idx="5"/>
           </p:nvPr>
         </p:nvSpPr>
         <p:spPr/>
         <p:txBody>
           <a:bodyPr/>
           <a:p>
-            <a:fld id="{067CB74D-FB7A-4145-A738-D0674729B831}" type="slidenum">
+            <a:fld id="{F05C1C55-D4D3-465D-9927-C0EBEDE8FACE}" type="slidenum">
               <a:t>&lt;#&gt;</a:t>
             </a:fld>
           </a:p>
@@ -2787,7 +2500,7 @@
             <a:spLocks noGrp="1"/>
           </p:cNvSpPr>
           <p:nvPr>
-            <p:ph type="dt" idx="4"/>
+            <p:ph type="dt" idx="6"/>
           </p:nvPr>
         </p:nvSpPr>
         <p:spPr/>
@@ -2851,11 +2564,11 @@
             <a:noAutofit/>
           </a:bodyPr>
           <a:p>
-            <a:endParaRPr b="0" lang="en-US" sz="1800" spc="-1" strike="noStrike">
-              <a:solidFill>
-                <a:srgbClr val="000000"/>
-              </a:solidFill>
-              <a:latin typeface="Calibri"/>
+            <a:pPr algn="ctr">
+              <a:buNone/>
+            </a:pPr>
+            <a:endParaRPr b="0" lang="en-IN" sz="4400" spc="-1" strike="noStrike">
+              <a:latin typeface="Arial"/>
             </a:endParaRPr>
           </a:p>
         </p:txBody>
@@ -2888,20 +2601,8 @@
             <a:normAutofit/>
           </a:bodyPr>
           <a:p>
-            <a:pPr>
-              <a:lnSpc>
-                <a:spcPct val="90000"/>
-              </a:lnSpc>
-              <a:spcBef>
-                <a:spcPts val="1417"/>
-              </a:spcBef>
-              <a:buNone/>
-            </a:pPr>
-            <a:endParaRPr b="0" lang="en-US" sz="2800" spc="-1" strike="noStrike">
-              <a:solidFill>
-                <a:srgbClr val="000000"/>
-              </a:solidFill>
-              <a:latin typeface="Calibri"/>
+            <a:endParaRPr b="0" lang="en-IN" sz="3200" spc="-1" strike="noStrike">
+              <a:latin typeface="Arial"/>
             </a:endParaRPr>
           </a:p>
         </p:txBody>
@@ -2934,20 +2635,8 @@
             <a:normAutofit/>
           </a:bodyPr>
           <a:p>
-            <a:pPr>
-              <a:lnSpc>
-                <a:spcPct val="90000"/>
-              </a:lnSpc>
-              <a:spcBef>
-                <a:spcPts val="1417"/>
-              </a:spcBef>
-              <a:buNone/>
-            </a:pPr>
-            <a:endParaRPr b="0" lang="en-US" sz="2800" spc="-1" strike="noStrike">
-              <a:solidFill>
-                <a:srgbClr val="000000"/>
-              </a:solidFill>
-              <a:latin typeface="Calibri"/>
+            <a:endParaRPr b="0" lang="en-IN" sz="3200" spc="-1" strike="noStrike">
+              <a:latin typeface="Arial"/>
             </a:endParaRPr>
           </a:p>
         </p:txBody>
@@ -2959,7 +2648,7 @@
             <a:spLocks noGrp="1"/>
           </p:cNvSpPr>
           <p:nvPr>
-            <p:ph type="ftr" idx="5"/>
+            <p:ph type="ftr" idx="4"/>
           </p:nvPr>
         </p:nvSpPr>
         <p:spPr/>
@@ -2979,14 +2668,14 @@
             <a:spLocks noGrp="1"/>
           </p:cNvSpPr>
           <p:nvPr>
-            <p:ph type="sldNum" idx="6"/>
+            <p:ph type="sldNum" idx="5"/>
           </p:nvPr>
         </p:nvSpPr>
         <p:spPr/>
         <p:txBody>
           <a:bodyPr/>
           <a:p>
-            <a:fld id="{424C1AC6-FC73-4F29-A269-81B90F575CA7}" type="slidenum">
+            <a:fld id="{4B19AA27-68D9-4183-9C5B-CB3D4A205B97}" type="slidenum">
               <a:t>&lt;#&gt;</a:t>
             </a:fld>
           </a:p>
@@ -2999,7 +2688,7 @@
             <a:spLocks noGrp="1"/>
           </p:cNvSpPr>
           <p:nvPr>
-            <p:ph type="dt" idx="4"/>
+            <p:ph type="dt" idx="6"/>
           </p:nvPr>
         </p:nvSpPr>
         <p:spPr/>
@@ -3063,11 +2752,11 @@
             <a:noAutofit/>
           </a:bodyPr>
           <a:p>
-            <a:endParaRPr b="0" lang="en-US" sz="1800" spc="-1" strike="noStrike">
-              <a:solidFill>
-                <a:srgbClr val="000000"/>
-              </a:solidFill>
-              <a:latin typeface="Calibri"/>
+            <a:pPr algn="ctr">
+              <a:buNone/>
+            </a:pPr>
+            <a:endParaRPr b="0" lang="en-IN" sz="4400" spc="-1" strike="noStrike">
+              <a:latin typeface="Arial"/>
             </a:endParaRPr>
           </a:p>
         </p:txBody>
@@ -3100,20 +2789,8 @@
             <a:normAutofit/>
           </a:bodyPr>
           <a:p>
-            <a:pPr>
-              <a:lnSpc>
-                <a:spcPct val="90000"/>
-              </a:lnSpc>
-              <a:spcBef>
-                <a:spcPts val="1417"/>
-              </a:spcBef>
-              <a:buNone/>
-            </a:pPr>
-            <a:endParaRPr b="0" lang="en-US" sz="2800" spc="-1" strike="noStrike">
-              <a:solidFill>
-                <a:srgbClr val="000000"/>
-              </a:solidFill>
-              <a:latin typeface="Calibri"/>
+            <a:endParaRPr b="0" lang="en-IN" sz="3200" spc="-1" strike="noStrike">
+              <a:latin typeface="Arial"/>
             </a:endParaRPr>
           </a:p>
         </p:txBody>
@@ -3146,20 +2823,8 @@
             <a:normAutofit/>
           </a:bodyPr>
           <a:p>
-            <a:pPr>
-              <a:lnSpc>
-                <a:spcPct val="90000"/>
-              </a:lnSpc>
-              <a:spcBef>
-                <a:spcPts val="1417"/>
-              </a:spcBef>
-              <a:buNone/>
-            </a:pPr>
-            <a:endParaRPr b="0" lang="en-US" sz="2800" spc="-1" strike="noStrike">
-              <a:solidFill>
-                <a:srgbClr val="000000"/>
-              </a:solidFill>
-              <a:latin typeface="Calibri"/>
+            <a:endParaRPr b="0" lang="en-IN" sz="3200" spc="-1" strike="noStrike">
+              <a:latin typeface="Arial"/>
             </a:endParaRPr>
           </a:p>
         </p:txBody>
@@ -3192,20 +2857,8 @@
             <a:normAutofit/>
           </a:bodyPr>
           <a:p>
-            <a:pPr>
-              <a:lnSpc>
-                <a:spcPct val="90000"/>
-              </a:lnSpc>
-              <a:spcBef>
-                <a:spcPts val="1417"/>
-              </a:spcBef>
-              <a:buNone/>
-            </a:pPr>
-            <a:endParaRPr b="0" lang="en-US" sz="2800" spc="-1" strike="noStrike">
-              <a:solidFill>
-                <a:srgbClr val="000000"/>
-              </a:solidFill>
-              <a:latin typeface="Calibri"/>
+            <a:endParaRPr b="0" lang="en-IN" sz="3200" spc="-1" strike="noStrike">
+              <a:latin typeface="Arial"/>
             </a:endParaRPr>
           </a:p>
         </p:txBody>
@@ -3238,20 +2891,8 @@
             <a:normAutofit/>
           </a:bodyPr>
           <a:p>
-            <a:pPr>
-              <a:lnSpc>
-                <a:spcPct val="90000"/>
-              </a:lnSpc>
-              <a:spcBef>
-                <a:spcPts val="1417"/>
-              </a:spcBef>
-              <a:buNone/>
-            </a:pPr>
-            <a:endParaRPr b="0" lang="en-US" sz="2800" spc="-1" strike="noStrike">
-              <a:solidFill>
-                <a:srgbClr val="000000"/>
-              </a:solidFill>
-              <a:latin typeface="Calibri"/>
+            <a:endParaRPr b="0" lang="en-IN" sz="3200" spc="-1" strike="noStrike">
+              <a:latin typeface="Arial"/>
             </a:endParaRPr>
           </a:p>
         </p:txBody>
@@ -3263,7 +2904,7 @@
             <a:spLocks noGrp="1"/>
           </p:cNvSpPr>
           <p:nvPr>
-            <p:ph type="ftr" idx="5"/>
+            <p:ph type="ftr" idx="4"/>
           </p:nvPr>
         </p:nvSpPr>
         <p:spPr/>
@@ -3283,14 +2924,14 @@
             <a:spLocks noGrp="1"/>
           </p:cNvSpPr>
           <p:nvPr>
-            <p:ph type="sldNum" idx="6"/>
+            <p:ph type="sldNum" idx="5"/>
           </p:nvPr>
         </p:nvSpPr>
         <p:spPr/>
         <p:txBody>
           <a:bodyPr/>
           <a:p>
-            <a:fld id="{4561A3FD-CFFD-44A0-B046-152B5564A360}" type="slidenum">
+            <a:fld id="{E83CA104-37C5-4A15-8435-A6274A4EC25A}" type="slidenum">
               <a:t>&lt;#&gt;</a:t>
             </a:fld>
           </a:p>
@@ -3303,7 +2944,7 @@
             <a:spLocks noGrp="1"/>
           </p:cNvSpPr>
           <p:nvPr>
-            <p:ph type="dt" idx="4"/>
+            <p:ph type="dt" idx="6"/>
           </p:nvPr>
         </p:nvSpPr>
         <p:spPr/>
@@ -3367,11 +3008,11 @@
             <a:noAutofit/>
           </a:bodyPr>
           <a:p>
-            <a:endParaRPr b="0" lang="en-US" sz="1800" spc="-1" strike="noStrike">
-              <a:solidFill>
-                <a:srgbClr val="000000"/>
-              </a:solidFill>
-              <a:latin typeface="Calibri"/>
+            <a:pPr algn="ctr">
+              <a:buNone/>
+            </a:pPr>
+            <a:endParaRPr b="0" lang="en-IN" sz="4400" spc="-1" strike="noStrike">
+              <a:latin typeface="Arial"/>
             </a:endParaRPr>
           </a:p>
         </p:txBody>
@@ -3404,20 +3045,8 @@
             <a:normAutofit/>
           </a:bodyPr>
           <a:p>
-            <a:pPr>
-              <a:lnSpc>
-                <a:spcPct val="90000"/>
-              </a:lnSpc>
-              <a:spcBef>
-                <a:spcPts val="1417"/>
-              </a:spcBef>
-              <a:buNone/>
-            </a:pPr>
-            <a:endParaRPr b="0" lang="en-US" sz="2800" spc="-1" strike="noStrike">
-              <a:solidFill>
-                <a:srgbClr val="000000"/>
-              </a:solidFill>
-              <a:latin typeface="Calibri"/>
+            <a:endParaRPr b="0" lang="en-IN" sz="3200" spc="-1" strike="noStrike">
+              <a:latin typeface="Arial"/>
             </a:endParaRPr>
           </a:p>
         </p:txBody>
@@ -3450,20 +3079,8 @@
             <a:normAutofit/>
           </a:bodyPr>
           <a:p>
-            <a:pPr>
-              <a:lnSpc>
-                <a:spcPct val="90000"/>
-              </a:lnSpc>
-              <a:spcBef>
-                <a:spcPts val="1417"/>
-              </a:spcBef>
-              <a:buNone/>
-            </a:pPr>
-            <a:endParaRPr b="0" lang="en-US" sz="2800" spc="-1" strike="noStrike">
-              <a:solidFill>
-                <a:srgbClr val="000000"/>
-              </a:solidFill>
-              <a:latin typeface="Calibri"/>
+            <a:endParaRPr b="0" lang="en-IN" sz="3200" spc="-1" strike="noStrike">
+              <a:latin typeface="Arial"/>
             </a:endParaRPr>
           </a:p>
         </p:txBody>
@@ -3496,20 +3113,8 @@
             <a:normAutofit/>
           </a:bodyPr>
           <a:p>
-            <a:pPr>
-              <a:lnSpc>
-                <a:spcPct val="90000"/>
-              </a:lnSpc>
-              <a:spcBef>
-                <a:spcPts val="1417"/>
-              </a:spcBef>
-              <a:buNone/>
-            </a:pPr>
-            <a:endParaRPr b="0" lang="en-US" sz="2800" spc="-1" strike="noStrike">
-              <a:solidFill>
-                <a:srgbClr val="000000"/>
-              </a:solidFill>
-              <a:latin typeface="Calibri"/>
+            <a:endParaRPr b="0" lang="en-IN" sz="3200" spc="-1" strike="noStrike">
+              <a:latin typeface="Arial"/>
             </a:endParaRPr>
           </a:p>
         </p:txBody>
@@ -3542,20 +3147,8 @@
             <a:normAutofit/>
           </a:bodyPr>
           <a:p>
-            <a:pPr>
-              <a:lnSpc>
-                <a:spcPct val="90000"/>
-              </a:lnSpc>
-              <a:spcBef>
-                <a:spcPts val="1417"/>
-              </a:spcBef>
-              <a:buNone/>
-            </a:pPr>
-            <a:endParaRPr b="0" lang="en-US" sz="2800" spc="-1" strike="noStrike">
-              <a:solidFill>
-                <a:srgbClr val="000000"/>
-              </a:solidFill>
-              <a:latin typeface="Calibri"/>
+            <a:endParaRPr b="0" lang="en-IN" sz="3200" spc="-1" strike="noStrike">
+              <a:latin typeface="Arial"/>
             </a:endParaRPr>
           </a:p>
         </p:txBody>
@@ -3588,20 +3181,8 @@
             <a:normAutofit/>
           </a:bodyPr>
           <a:p>
-            <a:pPr>
-              <a:lnSpc>
-                <a:spcPct val="90000"/>
-              </a:lnSpc>
-              <a:spcBef>
-                <a:spcPts val="1417"/>
-              </a:spcBef>
-              <a:buNone/>
-            </a:pPr>
-            <a:endParaRPr b="0" lang="en-US" sz="2800" spc="-1" strike="noStrike">
-              <a:solidFill>
-                <a:srgbClr val="000000"/>
-              </a:solidFill>
-              <a:latin typeface="Calibri"/>
+            <a:endParaRPr b="0" lang="en-IN" sz="3200" spc="-1" strike="noStrike">
+              <a:latin typeface="Arial"/>
             </a:endParaRPr>
           </a:p>
         </p:txBody>
@@ -3634,20 +3215,8 @@
             <a:normAutofit/>
           </a:bodyPr>
           <a:p>
-            <a:pPr>
-              <a:lnSpc>
-                <a:spcPct val="90000"/>
-              </a:lnSpc>
-              <a:spcBef>
-                <a:spcPts val="1417"/>
-              </a:spcBef>
-              <a:buNone/>
-            </a:pPr>
-            <a:endParaRPr b="0" lang="en-US" sz="2800" spc="-1" strike="noStrike">
-              <a:solidFill>
-                <a:srgbClr val="000000"/>
-              </a:solidFill>
-              <a:latin typeface="Calibri"/>
+            <a:endParaRPr b="0" lang="en-IN" sz="3200" spc="-1" strike="noStrike">
+              <a:latin typeface="Arial"/>
             </a:endParaRPr>
           </a:p>
         </p:txBody>
@@ -3659,7 +3228,7 @@
             <a:spLocks noGrp="1"/>
           </p:cNvSpPr>
           <p:nvPr>
-            <p:ph type="ftr" idx="5"/>
+            <p:ph type="ftr" idx="4"/>
           </p:nvPr>
         </p:nvSpPr>
         <p:spPr/>
@@ -3679,14 +3248,14 @@
             <a:spLocks noGrp="1"/>
           </p:cNvSpPr>
           <p:nvPr>
-            <p:ph type="sldNum" idx="6"/>
+            <p:ph type="sldNum" idx="5"/>
           </p:nvPr>
         </p:nvSpPr>
         <p:spPr/>
         <p:txBody>
           <a:bodyPr/>
           <a:p>
-            <a:fld id="{DDEFB4DE-F032-4659-9837-8A2E96E6DA46}" type="slidenum">
+            <a:fld id="{DC4B0B7A-E440-416D-A364-F2E501785626}" type="slidenum">
               <a:t>&lt;#&gt;</a:t>
             </a:fld>
           </a:p>
@@ -3699,7 +3268,7 @@
             <a:spLocks noGrp="1"/>
           </p:cNvSpPr>
           <p:nvPr>
-            <p:ph type="dt" idx="4"/>
+            <p:ph type="dt" idx="6"/>
           </p:nvPr>
         </p:nvSpPr>
         <p:spPr/>
@@ -3763,11 +3332,11 @@
             <a:noAutofit/>
           </a:bodyPr>
           <a:p>
-            <a:endParaRPr b="0" lang="en-US" sz="1800" spc="-1" strike="noStrike">
-              <a:solidFill>
-                <a:srgbClr val="000000"/>
-              </a:solidFill>
-              <a:latin typeface="Calibri"/>
+            <a:pPr algn="ctr">
+              <a:buNone/>
+            </a:pPr>
+            <a:endParaRPr b="0" lang="en-IN" sz="4400" spc="-1" strike="noStrike">
+              <a:latin typeface="Arial"/>
             </a:endParaRPr>
           </a:p>
         </p:txBody>
@@ -3800,20 +3369,8 @@
             <a:normAutofit/>
           </a:bodyPr>
           <a:p>
-            <a:pPr>
-              <a:lnSpc>
-                <a:spcPct val="90000"/>
-              </a:lnSpc>
-              <a:spcBef>
-                <a:spcPts val="1417"/>
-              </a:spcBef>
-              <a:buNone/>
-            </a:pPr>
-            <a:endParaRPr b="0" lang="en-US" sz="2800" spc="-1" strike="noStrike">
-              <a:solidFill>
-                <a:srgbClr val="000000"/>
-              </a:solidFill>
-              <a:latin typeface="Calibri"/>
+            <a:endParaRPr b="0" lang="en-IN" sz="3200" spc="-1" strike="noStrike">
+              <a:latin typeface="Arial"/>
             </a:endParaRPr>
           </a:p>
         </p:txBody>
@@ -3825,7 +3382,7 @@
             <a:spLocks noGrp="1"/>
           </p:cNvSpPr>
           <p:nvPr>
-            <p:ph type="ftr" idx="2"/>
+            <p:ph type="ftr" idx="1"/>
           </p:nvPr>
         </p:nvSpPr>
         <p:spPr/>
@@ -3845,14 +3402,14 @@
             <a:spLocks noGrp="1"/>
           </p:cNvSpPr>
           <p:nvPr>
-            <p:ph type="sldNum" idx="3"/>
+            <p:ph type="sldNum" idx="2"/>
           </p:nvPr>
         </p:nvSpPr>
         <p:spPr/>
         <p:txBody>
           <a:bodyPr/>
           <a:p>
-            <a:fld id="{B4717D9E-3439-40A1-93E7-F22004ACA960}" type="slidenum">
+            <a:fld id="{F8358F26-CF9D-480B-8C5D-9F54C819A0C4}" type="slidenum">
               <a:t>&lt;#&gt;</a:t>
             </a:fld>
           </a:p>
@@ -3865,7 +3422,7 @@
             <a:spLocks noGrp="1"/>
           </p:cNvSpPr>
           <p:nvPr>
-            <p:ph type="dt" idx="1"/>
+            <p:ph type="dt" idx="3"/>
           </p:nvPr>
         </p:nvSpPr>
         <p:spPr/>
@@ -3929,11 +3486,11 @@
             <a:noAutofit/>
           </a:bodyPr>
           <a:p>
-            <a:endParaRPr b="0" lang="en-US" sz="1800" spc="-1" strike="noStrike">
-              <a:solidFill>
-                <a:srgbClr val="000000"/>
-              </a:solidFill>
-              <a:latin typeface="Calibri"/>
+            <a:pPr algn="ctr">
+              <a:buNone/>
+            </a:pPr>
+            <a:endParaRPr b="0" lang="en-IN" sz="4400" spc="-1" strike="noStrike">
+              <a:latin typeface="Arial"/>
             </a:endParaRPr>
           </a:p>
         </p:txBody>
@@ -3966,20 +3523,8 @@
             <a:normAutofit/>
           </a:bodyPr>
           <a:p>
-            <a:pPr>
-              <a:lnSpc>
-                <a:spcPct val="90000"/>
-              </a:lnSpc>
-              <a:spcBef>
-                <a:spcPts val="1417"/>
-              </a:spcBef>
-              <a:buNone/>
-            </a:pPr>
-            <a:endParaRPr b="0" lang="en-US" sz="2800" spc="-1" strike="noStrike">
-              <a:solidFill>
-                <a:srgbClr val="000000"/>
-              </a:solidFill>
-              <a:latin typeface="Calibri"/>
+            <a:endParaRPr b="0" lang="en-IN" sz="3200" spc="-1" strike="noStrike">
+              <a:latin typeface="Arial"/>
             </a:endParaRPr>
           </a:p>
         </p:txBody>
@@ -4012,20 +3557,8 @@
             <a:normAutofit/>
           </a:bodyPr>
           <a:p>
-            <a:pPr>
-              <a:lnSpc>
-                <a:spcPct val="90000"/>
-              </a:lnSpc>
-              <a:spcBef>
-                <a:spcPts val="1417"/>
-              </a:spcBef>
-              <a:buNone/>
-            </a:pPr>
-            <a:endParaRPr b="0" lang="en-US" sz="2800" spc="-1" strike="noStrike">
-              <a:solidFill>
-                <a:srgbClr val="000000"/>
-              </a:solidFill>
-              <a:latin typeface="Calibri"/>
+            <a:endParaRPr b="0" lang="en-IN" sz="3200" spc="-1" strike="noStrike">
+              <a:latin typeface="Arial"/>
             </a:endParaRPr>
           </a:p>
         </p:txBody>
@@ -4037,7 +3570,7 @@
             <a:spLocks noGrp="1"/>
           </p:cNvSpPr>
           <p:nvPr>
-            <p:ph type="ftr" idx="2"/>
+            <p:ph type="ftr" idx="1"/>
           </p:nvPr>
         </p:nvSpPr>
         <p:spPr/>
@@ -4057,14 +3590,14 @@
             <a:spLocks noGrp="1"/>
           </p:cNvSpPr>
           <p:nvPr>
-            <p:ph type="sldNum" idx="3"/>
+            <p:ph type="sldNum" idx="2"/>
           </p:nvPr>
         </p:nvSpPr>
         <p:spPr/>
         <p:txBody>
           <a:bodyPr/>
           <a:p>
-            <a:fld id="{CB86AA88-4892-4E20-99B5-815D2AFF1AA8}" type="slidenum">
+            <a:fld id="{A9F91E35-A137-4ABF-B940-6459A5E0308F}" type="slidenum">
               <a:t>&lt;#&gt;</a:t>
             </a:fld>
           </a:p>
@@ -4077,7 +3610,7 @@
             <a:spLocks noGrp="1"/>
           </p:cNvSpPr>
           <p:nvPr>
-            <p:ph type="dt" idx="1"/>
+            <p:ph type="dt" idx="3"/>
           </p:nvPr>
         </p:nvSpPr>
         <p:spPr/>
@@ -4141,11 +3674,11 @@
             <a:noAutofit/>
           </a:bodyPr>
           <a:p>
-            <a:endParaRPr b="0" lang="en-US" sz="1800" spc="-1" strike="noStrike">
-              <a:solidFill>
-                <a:srgbClr val="000000"/>
-              </a:solidFill>
-              <a:latin typeface="Calibri"/>
+            <a:pPr algn="ctr">
+              <a:buNone/>
+            </a:pPr>
+            <a:endParaRPr b="0" lang="en-IN" sz="4400" spc="-1" strike="noStrike">
+              <a:latin typeface="Arial"/>
             </a:endParaRPr>
           </a:p>
         </p:txBody>
@@ -4157,7 +3690,7 @@
             <a:spLocks noGrp="1"/>
           </p:cNvSpPr>
           <p:nvPr>
-            <p:ph type="ftr" idx="2"/>
+            <p:ph type="ftr" idx="1"/>
           </p:nvPr>
         </p:nvSpPr>
         <p:spPr/>
@@ -4177,14 +3710,14 @@
             <a:spLocks noGrp="1"/>
           </p:cNvSpPr>
           <p:nvPr>
-            <p:ph type="sldNum" idx="3"/>
+            <p:ph type="sldNum" idx="2"/>
           </p:nvPr>
         </p:nvSpPr>
         <p:spPr/>
         <p:txBody>
           <a:bodyPr/>
           <a:p>
-            <a:fld id="{377C8708-7B3F-4D09-B2FC-FBC07E573C20}" type="slidenum">
+            <a:fld id="{C6040E41-DE67-4F6E-B82F-302F5111BA21}" type="slidenum">
               <a:t>&lt;#&gt;</a:t>
             </a:fld>
           </a:p>
@@ -4197,7 +3730,7 @@
             <a:spLocks noGrp="1"/>
           </p:cNvSpPr>
           <p:nvPr>
-            <p:ph type="dt" idx="1"/>
+            <p:ph type="dt" idx="3"/>
           </p:nvPr>
         </p:nvSpPr>
         <p:spPr/>
@@ -4277,7 +3810,7 @@
             <a:spLocks noGrp="1"/>
           </p:cNvSpPr>
           <p:nvPr>
-            <p:ph type="ftr" idx="2"/>
+            <p:ph type="ftr" idx="1"/>
           </p:nvPr>
         </p:nvSpPr>
         <p:spPr/>
@@ -4297,14 +3830,14 @@
             <a:spLocks noGrp="1"/>
           </p:cNvSpPr>
           <p:nvPr>
-            <p:ph type="sldNum" idx="3"/>
+            <p:ph type="sldNum" idx="2"/>
           </p:nvPr>
         </p:nvSpPr>
         <p:spPr/>
         <p:txBody>
           <a:bodyPr/>
           <a:p>
-            <a:fld id="{5CB113B7-307F-48E6-8577-9EA354210F4A}" type="slidenum">
+            <a:fld id="{90E96AE0-E9F2-4008-94C3-48F66B8CE82A}" type="slidenum">
               <a:t>&lt;#&gt;</a:t>
             </a:fld>
           </a:p>
@@ -4317,7 +3850,7 @@
             <a:spLocks noGrp="1"/>
           </p:cNvSpPr>
           <p:nvPr>
-            <p:ph type="dt" idx="1"/>
+            <p:ph type="dt" idx="3"/>
           </p:nvPr>
         </p:nvSpPr>
         <p:spPr/>
@@ -4381,11 +3914,11 @@
             <a:noAutofit/>
           </a:bodyPr>
           <a:p>
-            <a:endParaRPr b="0" lang="en-US" sz="1800" spc="-1" strike="noStrike">
-              <a:solidFill>
-                <a:srgbClr val="000000"/>
-              </a:solidFill>
-              <a:latin typeface="Calibri"/>
+            <a:pPr algn="ctr">
+              <a:buNone/>
+            </a:pPr>
+            <a:endParaRPr b="0" lang="en-IN" sz="4400" spc="-1" strike="noStrike">
+              <a:latin typeface="Arial"/>
             </a:endParaRPr>
           </a:p>
         </p:txBody>
@@ -4418,20 +3951,8 @@
             <a:normAutofit/>
           </a:bodyPr>
           <a:p>
-            <a:pPr>
-              <a:lnSpc>
-                <a:spcPct val="90000"/>
-              </a:lnSpc>
-              <a:spcBef>
-                <a:spcPts val="1417"/>
-              </a:spcBef>
-              <a:buNone/>
-            </a:pPr>
-            <a:endParaRPr b="0" lang="en-US" sz="2800" spc="-1" strike="noStrike">
-              <a:solidFill>
-                <a:srgbClr val="000000"/>
-              </a:solidFill>
-              <a:latin typeface="Calibri"/>
+            <a:endParaRPr b="0" lang="en-IN" sz="3200" spc="-1" strike="noStrike">
+              <a:latin typeface="Arial"/>
             </a:endParaRPr>
           </a:p>
         </p:txBody>
@@ -4464,20 +3985,8 @@
             <a:normAutofit/>
           </a:bodyPr>
           <a:p>
-            <a:pPr>
-              <a:lnSpc>
-                <a:spcPct val="90000"/>
-              </a:lnSpc>
-              <a:spcBef>
-                <a:spcPts val="1417"/>
-              </a:spcBef>
-              <a:buNone/>
-            </a:pPr>
-            <a:endParaRPr b="0" lang="en-US" sz="2800" spc="-1" strike="noStrike">
-              <a:solidFill>
-                <a:srgbClr val="000000"/>
-              </a:solidFill>
-              <a:latin typeface="Calibri"/>
+            <a:endParaRPr b="0" lang="en-IN" sz="3200" spc="-1" strike="noStrike">
+              <a:latin typeface="Arial"/>
             </a:endParaRPr>
           </a:p>
         </p:txBody>
@@ -4510,20 +4019,8 @@
             <a:normAutofit/>
           </a:bodyPr>
           <a:p>
-            <a:pPr>
-              <a:lnSpc>
-                <a:spcPct val="90000"/>
-              </a:lnSpc>
-              <a:spcBef>
-                <a:spcPts val="1417"/>
-              </a:spcBef>
-              <a:buNone/>
-            </a:pPr>
-            <a:endParaRPr b="0" lang="en-US" sz="2800" spc="-1" strike="noStrike">
-              <a:solidFill>
-                <a:srgbClr val="000000"/>
-              </a:solidFill>
-              <a:latin typeface="Calibri"/>
+            <a:endParaRPr b="0" lang="en-IN" sz="3200" spc="-1" strike="noStrike">
+              <a:latin typeface="Arial"/>
             </a:endParaRPr>
           </a:p>
         </p:txBody>
@@ -4535,7 +4032,7 @@
             <a:spLocks noGrp="1"/>
           </p:cNvSpPr>
           <p:nvPr>
-            <p:ph type="ftr" idx="2"/>
+            <p:ph type="ftr" idx="1"/>
           </p:nvPr>
         </p:nvSpPr>
         <p:spPr/>
@@ -4555,14 +4052,14 @@
             <a:spLocks noGrp="1"/>
           </p:cNvSpPr>
           <p:nvPr>
-            <p:ph type="sldNum" idx="3"/>
+            <p:ph type="sldNum" idx="2"/>
           </p:nvPr>
         </p:nvSpPr>
         <p:spPr/>
         <p:txBody>
           <a:bodyPr/>
           <a:p>
-            <a:fld id="{46FC3240-CF78-4A7C-9F6A-18A128CF3E64}" type="slidenum">
+            <a:fld id="{2875A6D1-56F4-4AF6-A58A-4B29B57A349D}" type="slidenum">
               <a:t>&lt;#&gt;</a:t>
             </a:fld>
           </a:p>
@@ -4575,7 +4072,7 @@
             <a:spLocks noGrp="1"/>
           </p:cNvSpPr>
           <p:nvPr>
-            <p:ph type="dt" idx="1"/>
+            <p:ph type="dt" idx="3"/>
           </p:nvPr>
         </p:nvSpPr>
         <p:spPr/>
@@ -4639,11 +4136,11 @@
             <a:noAutofit/>
           </a:bodyPr>
           <a:p>
-            <a:endParaRPr b="0" lang="en-US" sz="1800" spc="-1" strike="noStrike">
-              <a:solidFill>
-                <a:srgbClr val="000000"/>
-              </a:solidFill>
-              <a:latin typeface="Calibri"/>
+            <a:pPr algn="ctr">
+              <a:buNone/>
+            </a:pPr>
+            <a:endParaRPr b="0" lang="en-IN" sz="4400" spc="-1" strike="noStrike">
+              <a:latin typeface="Arial"/>
             </a:endParaRPr>
           </a:p>
         </p:txBody>
@@ -4676,20 +4173,8 @@
             <a:normAutofit/>
           </a:bodyPr>
           <a:p>
-            <a:pPr>
-              <a:lnSpc>
-                <a:spcPct val="90000"/>
-              </a:lnSpc>
-              <a:spcBef>
-                <a:spcPts val="1417"/>
-              </a:spcBef>
-              <a:buNone/>
-            </a:pPr>
-            <a:endParaRPr b="0" lang="en-US" sz="2800" spc="-1" strike="noStrike">
-              <a:solidFill>
-                <a:srgbClr val="000000"/>
-              </a:solidFill>
-              <a:latin typeface="Calibri"/>
+            <a:endParaRPr b="0" lang="en-IN" sz="3200" spc="-1" strike="noStrike">
+              <a:latin typeface="Arial"/>
             </a:endParaRPr>
           </a:p>
         </p:txBody>
@@ -4722,20 +4207,8 @@
             <a:normAutofit/>
           </a:bodyPr>
           <a:p>
-            <a:pPr>
-              <a:lnSpc>
-                <a:spcPct val="90000"/>
-              </a:lnSpc>
-              <a:spcBef>
-                <a:spcPts val="1417"/>
-              </a:spcBef>
-              <a:buNone/>
-            </a:pPr>
-            <a:endParaRPr b="0" lang="en-US" sz="2800" spc="-1" strike="noStrike">
-              <a:solidFill>
-                <a:srgbClr val="000000"/>
-              </a:solidFill>
-              <a:latin typeface="Calibri"/>
+            <a:endParaRPr b="0" lang="en-IN" sz="3200" spc="-1" strike="noStrike">
+              <a:latin typeface="Arial"/>
             </a:endParaRPr>
           </a:p>
         </p:txBody>
@@ -4768,20 +4241,8 @@
             <a:normAutofit/>
           </a:bodyPr>
           <a:p>
-            <a:pPr>
-              <a:lnSpc>
-                <a:spcPct val="90000"/>
-              </a:lnSpc>
-              <a:spcBef>
-                <a:spcPts val="1417"/>
-              </a:spcBef>
-              <a:buNone/>
-            </a:pPr>
-            <a:endParaRPr b="0" lang="en-US" sz="2800" spc="-1" strike="noStrike">
-              <a:solidFill>
-                <a:srgbClr val="000000"/>
-              </a:solidFill>
-              <a:latin typeface="Calibri"/>
+            <a:endParaRPr b="0" lang="en-IN" sz="3200" spc="-1" strike="noStrike">
+              <a:latin typeface="Arial"/>
             </a:endParaRPr>
           </a:p>
         </p:txBody>
@@ -4793,7 +4254,7 @@
             <a:spLocks noGrp="1"/>
           </p:cNvSpPr>
           <p:nvPr>
-            <p:ph type="ftr" idx="2"/>
+            <p:ph type="ftr" idx="1"/>
           </p:nvPr>
         </p:nvSpPr>
         <p:spPr/>
@@ -4813,14 +4274,14 @@
             <a:spLocks noGrp="1"/>
           </p:cNvSpPr>
           <p:nvPr>
-            <p:ph type="sldNum" idx="3"/>
+            <p:ph type="sldNum" idx="2"/>
           </p:nvPr>
         </p:nvSpPr>
         <p:spPr/>
         <p:txBody>
           <a:bodyPr/>
           <a:p>
-            <a:fld id="{8732C4D4-C454-4437-9D93-FCE5FBDD810B}" type="slidenum">
+            <a:fld id="{6879BA2F-1EE0-48DB-BDD8-E5EA8E60C1FE}" type="slidenum">
               <a:t>&lt;#&gt;</a:t>
             </a:fld>
           </a:p>
@@ -4833,7 +4294,7 @@
             <a:spLocks noGrp="1"/>
           </p:cNvSpPr>
           <p:nvPr>
-            <p:ph type="dt" idx="1"/>
+            <p:ph type="dt" idx="3"/>
           </p:nvPr>
         </p:nvSpPr>
         <p:spPr/>
@@ -4897,11 +4358,11 @@
             <a:noAutofit/>
           </a:bodyPr>
           <a:p>
-            <a:endParaRPr b="0" lang="en-US" sz="1800" spc="-1" strike="noStrike">
-              <a:solidFill>
-                <a:srgbClr val="000000"/>
-              </a:solidFill>
-              <a:latin typeface="Calibri"/>
+            <a:pPr algn="ctr">
+              <a:buNone/>
+            </a:pPr>
+            <a:endParaRPr b="0" lang="en-IN" sz="4400" spc="-1" strike="noStrike">
+              <a:latin typeface="Arial"/>
             </a:endParaRPr>
           </a:p>
         </p:txBody>
@@ -4934,20 +4395,8 @@
             <a:normAutofit/>
           </a:bodyPr>
           <a:p>
-            <a:pPr>
-              <a:lnSpc>
-                <a:spcPct val="90000"/>
-              </a:lnSpc>
-              <a:spcBef>
-                <a:spcPts val="1417"/>
-              </a:spcBef>
-              <a:buNone/>
-            </a:pPr>
-            <a:endParaRPr b="0" lang="en-US" sz="2800" spc="-1" strike="noStrike">
-              <a:solidFill>
-                <a:srgbClr val="000000"/>
-              </a:solidFill>
-              <a:latin typeface="Calibri"/>
+            <a:endParaRPr b="0" lang="en-IN" sz="3200" spc="-1" strike="noStrike">
+              <a:latin typeface="Arial"/>
             </a:endParaRPr>
           </a:p>
         </p:txBody>
@@ -4980,20 +4429,8 @@
             <a:normAutofit/>
           </a:bodyPr>
           <a:p>
-            <a:pPr>
-              <a:lnSpc>
-                <a:spcPct val="90000"/>
-              </a:lnSpc>
-              <a:spcBef>
-                <a:spcPts val="1417"/>
-              </a:spcBef>
-              <a:buNone/>
-            </a:pPr>
-            <a:endParaRPr b="0" lang="en-US" sz="2800" spc="-1" strike="noStrike">
-              <a:solidFill>
-                <a:srgbClr val="000000"/>
-              </a:solidFill>
-              <a:latin typeface="Calibri"/>
+            <a:endParaRPr b="0" lang="en-IN" sz="3200" spc="-1" strike="noStrike">
+              <a:latin typeface="Arial"/>
             </a:endParaRPr>
           </a:p>
         </p:txBody>
@@ -5026,20 +4463,8 @@
             <a:normAutofit/>
           </a:bodyPr>
           <a:p>
-            <a:pPr>
-              <a:lnSpc>
-                <a:spcPct val="90000"/>
-              </a:lnSpc>
-              <a:spcBef>
-                <a:spcPts val="1417"/>
-              </a:spcBef>
-              <a:buNone/>
-            </a:pPr>
-            <a:endParaRPr b="0" lang="en-US" sz="2800" spc="-1" strike="noStrike">
-              <a:solidFill>
-                <a:srgbClr val="000000"/>
-              </a:solidFill>
-              <a:latin typeface="Calibri"/>
+            <a:endParaRPr b="0" lang="en-IN" sz="3200" spc="-1" strike="noStrike">
+              <a:latin typeface="Arial"/>
             </a:endParaRPr>
           </a:p>
         </p:txBody>
@@ -5051,7 +4476,7 @@
             <a:spLocks noGrp="1"/>
           </p:cNvSpPr>
           <p:nvPr>
-            <p:ph type="ftr" idx="2"/>
+            <p:ph type="ftr" idx="1"/>
           </p:nvPr>
         </p:nvSpPr>
         <p:spPr/>
@@ -5071,14 +4496,14 @@
             <a:spLocks noGrp="1"/>
           </p:cNvSpPr>
           <p:nvPr>
-            <p:ph type="sldNum" idx="3"/>
+            <p:ph type="sldNum" idx="2"/>
           </p:nvPr>
         </p:nvSpPr>
         <p:spPr/>
         <p:txBody>
           <a:bodyPr/>
           <a:p>
-            <a:fld id="{69A8711E-F046-440A-9ABF-A5130365AA15}" type="slidenum">
+            <a:fld id="{BDECAFC9-14A9-42EF-AB0D-FE08CF35492D}" type="slidenum">
               <a:t>&lt;#&gt;</a:t>
             </a:fld>
           </a:p>
@@ -5091,7 +4516,7 @@
             <a:spLocks noGrp="1"/>
           </p:cNvSpPr>
           <p:nvPr>
-            <p:ph type="dt" idx="1"/>
+            <p:ph type="dt" idx="3"/>
           </p:nvPr>
         </p:nvSpPr>
         <p:spPr/>
@@ -5146,84 +4571,138 @@
         </p:nvSpPr>
         <p:spPr>
           <a:xfrm>
-            <a:off x="1523880" y="1122480"/>
-            <a:ext cx="9143640" cy="2387160"/>
-          </a:xfrm>
-          <a:prstGeom prst="rect">
-            <a:avLst/>
-          </a:prstGeom>
-          <a:noFill/>
-          <a:ln w="0">
-            <a:noFill/>
-          </a:ln>
-        </p:spPr>
-        <p:txBody>
-          <a:bodyPr anchor="b">
+            <a:off x="609480" y="273600"/>
+            <a:ext cx="10972080" cy="1144440"/>
+          </a:xfrm>
+          <a:prstGeom prst="rect">
+            <a:avLst/>
+          </a:prstGeom>
+          <a:noFill/>
+          <a:ln w="0">
+            <a:noFill/>
+          </a:ln>
+        </p:spPr>
+        <p:txBody>
+          <a:bodyPr lIns="0" rIns="0" tIns="0" bIns="0" anchor="ctr">
             <a:noAutofit/>
           </a:bodyPr>
+          <a:p>
+            <a:r>
+              <a:rPr b="0" lang="en-IN" sz="1800" spc="-1" strike="noStrike">
+                <a:latin typeface="Arial"/>
+              </a:rPr>
+              <a:t>Click to </a:t>
+            </a:r>
+            <a:r>
+              <a:rPr b="0" lang="en-IN" sz="1800" spc="-1" strike="noStrike">
+                <a:latin typeface="Arial"/>
+              </a:rPr>
+              <a:t>edit the </a:t>
+            </a:r>
+            <a:r>
+              <a:rPr b="0" lang="en-IN" sz="1800" spc="-1" strike="noStrike">
+                <a:latin typeface="Arial"/>
+              </a:rPr>
+              <a:t>title text </a:t>
+            </a:r>
+            <a:r>
+              <a:rPr b="0" lang="en-IN" sz="1800" spc="-1" strike="noStrike">
+                <a:latin typeface="Arial"/>
+              </a:rPr>
+              <a:t>format</a:t>
+            </a:r>
+            <a:endParaRPr b="0" lang="en-IN" sz="1800" spc="-1" strike="noStrike">
+              <a:latin typeface="Arial"/>
+            </a:endParaRPr>
+          </a:p>
+        </p:txBody>
+      </p:sp>
+      <p:sp>
+        <p:nvSpPr>
+          <p:cNvPr id="1" name="PlaceHolder 2"/>
+          <p:cNvSpPr>
+            <a:spLocks noGrp="1"/>
+          </p:cNvSpPr>
+          <p:nvPr>
+            <p:ph type="ftr" idx="1"/>
+          </p:nvPr>
+        </p:nvSpPr>
+        <p:spPr>
+          <a:xfrm>
+            <a:off x="4038480" y="6356520"/>
+            <a:ext cx="4114080" cy="364320"/>
+          </a:xfrm>
+          <a:prstGeom prst="rect">
+            <a:avLst/>
+          </a:prstGeom>
+          <a:noFill/>
+          <a:ln w="0">
+            <a:noFill/>
+          </a:ln>
+        </p:spPr>
+        <p:txBody>
+          <a:bodyPr lIns="90000" rIns="90000" tIns="45000" bIns="45000" anchor="ctr">
+            <a:noAutofit/>
+          </a:bodyPr>
+          <a:lstStyle>
+            <a:lvl1pPr algn="ctr">
+              <a:lnSpc>
+                <a:spcPct val="100000"/>
+              </a:lnSpc>
+              <a:buNone/>
+              <a:defRPr b="0" lang="en-IN" sz="1400" spc="-1" strike="noStrike">
+                <a:latin typeface="Times New Roman"/>
+              </a:defRPr>
+            </a:lvl1pPr>
+          </a:lstStyle>
           <a:p>
             <a:pPr algn="ctr">
               <a:lnSpc>
-                <a:spcPct val="90000"/>
+                <a:spcPct val="100000"/>
               </a:lnSpc>
               <a:buNone/>
             </a:pPr>
             <a:r>
-              <a:rPr b="0" lang="en-US" sz="6000" spc="-1" strike="noStrike">
-                <a:solidFill>
-                  <a:srgbClr val="000000"/>
-                </a:solidFill>
-                <a:latin typeface="Calibri Light"/>
+              <a:rPr b="0" lang="en-IN" sz="1400" spc="-1" strike="noStrike">
+                <a:latin typeface="Times New Roman"/>
               </a:rPr>
-              <a:t>Click to edit Master title </a:t>
-            </a:r>
-            <a:r>
-              <a:rPr b="0" lang="en-US" sz="6000" spc="-1" strike="noStrike">
-                <a:solidFill>
-                  <a:srgbClr val="000000"/>
-                </a:solidFill>
-                <a:latin typeface="Calibri Light"/>
-              </a:rPr>
-              <a:t>style</a:t>
-            </a:r>
-            <a:endParaRPr b="0" lang="en-US" sz="6000" spc="-1" strike="noStrike">
-              <a:solidFill>
-                <a:srgbClr val="000000"/>
-              </a:solidFill>
-              <a:latin typeface="Calibri"/>
-            </a:endParaRPr>
-          </a:p>
-        </p:txBody>
-      </p:sp>
-      <p:sp>
-        <p:nvSpPr>
-          <p:cNvPr id="1" name="PlaceHolder 2"/>
-          <p:cNvSpPr>
-            <a:spLocks noGrp="1"/>
-          </p:cNvSpPr>
-          <p:nvPr>
-            <p:ph type="dt" idx="1"/>
-          </p:nvPr>
-        </p:nvSpPr>
-        <p:spPr>
-          <a:xfrm>
-            <a:off x="838080" y="6356520"/>
-            <a:ext cx="2742840" cy="364680"/>
-          </a:xfrm>
-          <a:prstGeom prst="rect">
-            <a:avLst/>
-          </a:prstGeom>
-          <a:noFill/>
-          <a:ln w="0">
-            <a:noFill/>
-          </a:ln>
-        </p:spPr>
-        <p:txBody>
-          <a:bodyPr anchor="ctr">
+              <a:t>&lt;footer&gt;</a:t>
+            </a:r>
+            <a:endParaRPr b="0" lang="en-IN" sz="1400" spc="-1" strike="noStrike">
+              <a:latin typeface="Times New Roman"/>
+            </a:endParaRPr>
+          </a:p>
+        </p:txBody>
+      </p:sp>
+      <p:sp>
+        <p:nvSpPr>
+          <p:cNvPr id="2" name="PlaceHolder 3"/>
+          <p:cNvSpPr>
+            <a:spLocks noGrp="1"/>
+          </p:cNvSpPr>
+          <p:nvPr>
+            <p:ph type="sldNum" idx="2"/>
+          </p:nvPr>
+        </p:nvSpPr>
+        <p:spPr>
+          <a:xfrm>
+            <a:off x="8610480" y="6356520"/>
+            <a:ext cx="2742480" cy="364320"/>
+          </a:xfrm>
+          <a:prstGeom prst="rect">
+            <a:avLst/>
+          </a:prstGeom>
+          <a:noFill/>
+          <a:ln w="0">
+            <a:noFill/>
+          </a:ln>
+        </p:spPr>
+        <p:txBody>
+          <a:bodyPr lIns="90000" rIns="90000" tIns="45000" bIns="45000" anchor="ctr">
             <a:noAutofit/>
           </a:bodyPr>
           <a:lstStyle>
-            <a:lvl1pPr>
+            <a:lvl1pPr algn="r">
               <a:lnSpc>
                 <a:spcPct val="100000"/>
               </a:lnSpc>
@@ -5237,127 +4716,13 @@
             </a:lvl1pPr>
           </a:lstStyle>
           <a:p>
-            <a:pPr>
-              <a:lnSpc>
-                <a:spcPct val="100000"/>
-              </a:lnSpc>
-              <a:buNone/>
-            </a:pPr>
-            <a:r>
-              <a:rPr b="0" lang="en-IN" sz="1200" spc="-1" strike="noStrike">
-                <a:solidFill>
-                  <a:srgbClr val="8b8b8b"/>
-                </a:solidFill>
-                <a:latin typeface="Calibri"/>
-              </a:rPr>
-              <a:t>&lt;date/time&gt;</a:t>
-            </a:r>
-            <a:endParaRPr b="0" lang="en-IN" sz="1200" spc="-1" strike="noStrike">
-              <a:latin typeface="Times New Roman"/>
-            </a:endParaRPr>
-          </a:p>
-        </p:txBody>
-      </p:sp>
-      <p:sp>
-        <p:nvSpPr>
-          <p:cNvPr id="2" name="PlaceHolder 3"/>
-          <p:cNvSpPr>
-            <a:spLocks noGrp="1"/>
-          </p:cNvSpPr>
-          <p:nvPr>
-            <p:ph type="ftr" idx="2"/>
-          </p:nvPr>
-        </p:nvSpPr>
-        <p:spPr>
-          <a:xfrm>
-            <a:off x="4038480" y="6356520"/>
-            <a:ext cx="4114440" cy="364680"/>
-          </a:xfrm>
-          <a:prstGeom prst="rect">
-            <a:avLst/>
-          </a:prstGeom>
-          <a:noFill/>
-          <a:ln w="0">
-            <a:noFill/>
-          </a:ln>
-        </p:spPr>
-        <p:txBody>
-          <a:bodyPr anchor="ctr">
-            <a:noAutofit/>
-          </a:bodyPr>
-          <a:lstStyle>
-            <a:lvl1pPr algn="ctr">
-              <a:buNone/>
-              <a:defRPr b="0" lang="en-IN" sz="1400" spc="-1" strike="noStrike">
-                <a:latin typeface="Times New Roman"/>
-              </a:defRPr>
-            </a:lvl1pPr>
-          </a:lstStyle>
-          <a:p>
-            <a:pPr algn="ctr">
-              <a:buNone/>
-            </a:pPr>
-            <a:r>
-              <a:rPr b="0" lang="en-IN" sz="1400" spc="-1" strike="noStrike">
-                <a:latin typeface="Times New Roman"/>
-              </a:rPr>
-              <a:t>&lt;footer&gt;</a:t>
-            </a:r>
-            <a:endParaRPr b="0" lang="en-IN" sz="1400" spc="-1" strike="noStrike">
-              <a:latin typeface="Times New Roman"/>
-            </a:endParaRPr>
-          </a:p>
-        </p:txBody>
-      </p:sp>
-      <p:sp>
-        <p:nvSpPr>
-          <p:cNvPr id="3" name="PlaceHolder 4"/>
-          <p:cNvSpPr>
-            <a:spLocks noGrp="1"/>
-          </p:cNvSpPr>
-          <p:nvPr>
-            <p:ph type="sldNum" idx="3"/>
-          </p:nvPr>
-        </p:nvSpPr>
-        <p:spPr>
-          <a:xfrm>
-            <a:off x="8610480" y="6356520"/>
-            <a:ext cx="2742840" cy="364680"/>
-          </a:xfrm>
-          <a:prstGeom prst="rect">
-            <a:avLst/>
-          </a:prstGeom>
-          <a:noFill/>
-          <a:ln w="0">
-            <a:noFill/>
-          </a:ln>
-        </p:spPr>
-        <p:txBody>
-          <a:bodyPr anchor="ctr">
-            <a:noAutofit/>
-          </a:bodyPr>
-          <a:lstStyle>
-            <a:lvl1pPr algn="r">
-              <a:lnSpc>
-                <a:spcPct val="100000"/>
-              </a:lnSpc>
-              <a:buNone/>
-              <a:defRPr b="0" lang="en-IN" sz="1200" spc="-1" strike="noStrike">
-                <a:solidFill>
-                  <a:srgbClr val="8b8b8b"/>
-                </a:solidFill>
-                <a:latin typeface="Calibri"/>
-              </a:defRPr>
-            </a:lvl1pPr>
-          </a:lstStyle>
-          <a:p>
             <a:pPr algn="r">
               <a:lnSpc>
                 <a:spcPct val="100000"/>
               </a:lnSpc>
               <a:buNone/>
             </a:pPr>
-            <a:fld id="{23E0DE21-AD3D-4779-A40C-77702506E2A7}" type="slidenum">
+            <a:fld id="{95A3C5DD-C34D-4CAA-B463-1F4B7EC452DB}" type="slidenum">
               <a:rPr b="0" lang="en-IN" sz="1200" spc="-1" strike="noStrike">
                 <a:solidFill>
                   <a:srgbClr val="8b8b8b"/>
@@ -5374,6 +4739,53 @@
       </p:sp>
       <p:sp>
         <p:nvSpPr>
+          <p:cNvPr id="3" name="PlaceHolder 4"/>
+          <p:cNvSpPr>
+            <a:spLocks noGrp="1"/>
+          </p:cNvSpPr>
+          <p:nvPr>
+            <p:ph type="dt" idx="3"/>
+          </p:nvPr>
+        </p:nvSpPr>
+        <p:spPr>
+          <a:xfrm>
+            <a:off x="838080" y="6356520"/>
+            <a:ext cx="2742480" cy="364320"/>
+          </a:xfrm>
+          <a:prstGeom prst="rect">
+            <a:avLst/>
+          </a:prstGeom>
+          <a:noFill/>
+          <a:ln w="0">
+            <a:noFill/>
+          </a:ln>
+        </p:spPr>
+        <p:txBody>
+          <a:bodyPr lIns="90000" rIns="90000" tIns="45000" bIns="45000" anchor="ctr">
+            <a:noAutofit/>
+          </a:bodyPr>
+          <a:lstStyle>
+            <a:lvl1pPr>
+              <a:defRPr b="0" lang="en-IN" sz="1400" spc="-1" strike="noStrike">
+                <a:latin typeface="Times New Roman"/>
+              </a:defRPr>
+            </a:lvl1pPr>
+          </a:lstStyle>
+          <a:p>
+            <a:r>
+              <a:rPr b="0" lang="en-IN" sz="1400" spc="-1" strike="noStrike">
+                <a:latin typeface="Times New Roman"/>
+              </a:rPr>
+              <a:t>&lt;date/time&gt;</a:t>
+            </a:r>
+            <a:endParaRPr b="0" lang="en-IN" sz="1400" spc="-1" strike="noStrike">
+              <a:latin typeface="Times New Roman"/>
+            </a:endParaRPr>
+          </a:p>
+        </p:txBody>
+      </p:sp>
+      <p:sp>
+        <p:nvSpPr>
           <p:cNvPr id="4" name="PlaceHolder 5"/>
           <p:cNvSpPr>
             <a:spLocks noGrp="1"/>
@@ -5401,9 +4813,6 @@
           </a:bodyPr>
           <a:p>
             <a:pPr marL="432000" indent="-324000">
-              <a:lnSpc>
-                <a:spcPct val="90000"/>
-              </a:lnSpc>
               <a:spcBef>
                 <a:spcPts val="1417"/>
               </a:spcBef>
@@ -5415,26 +4824,17 @@
               <a:buChar char=""/>
             </a:pPr>
             <a:r>
-              <a:rPr b="0" lang="en-US" sz="2800" spc="-1" strike="noStrike">
-                <a:solidFill>
-                  <a:srgbClr val="000000"/>
-                </a:solidFill>
-                <a:latin typeface="Calibri"/>
+              <a:rPr b="0" lang="en-IN" sz="3200" spc="-1" strike="noStrike">
+                <a:latin typeface="Arial"/>
               </a:rPr>
               <a:t>Click to edit the outline text format</a:t>
             </a:r>
-            <a:endParaRPr b="0" lang="en-US" sz="2800" spc="-1" strike="noStrike">
-              <a:solidFill>
-                <a:srgbClr val="000000"/>
-              </a:solidFill>
-              <a:latin typeface="Calibri"/>
+            <a:endParaRPr b="0" lang="en-IN" sz="3200" spc="-1" strike="noStrike">
+              <a:latin typeface="Arial"/>
             </a:endParaRPr>
           </a:p>
           <a:p>
             <a:pPr lvl="1" marL="864000" indent="-324000">
-              <a:lnSpc>
-                <a:spcPct val="90000"/>
-              </a:lnSpc>
               <a:spcBef>
                 <a:spcPts val="1134"/>
               </a:spcBef>
@@ -5446,26 +4846,17 @@
               <a:buChar char=""/>
             </a:pPr>
             <a:r>
-              <a:rPr b="0" lang="en-US" sz="2000" spc="-1" strike="noStrike">
-                <a:solidFill>
-                  <a:srgbClr val="000000"/>
-                </a:solidFill>
-                <a:latin typeface="Calibri"/>
+              <a:rPr b="0" lang="en-IN" sz="2800" spc="-1" strike="noStrike">
+                <a:latin typeface="Arial"/>
               </a:rPr>
               <a:t>Second Outline Level</a:t>
             </a:r>
-            <a:endParaRPr b="0" lang="en-US" sz="2000" spc="-1" strike="noStrike">
-              <a:solidFill>
-                <a:srgbClr val="000000"/>
-              </a:solidFill>
-              <a:latin typeface="Calibri"/>
+            <a:endParaRPr b="0" lang="en-IN" sz="2800" spc="-1" strike="noStrike">
+              <a:latin typeface="Arial"/>
             </a:endParaRPr>
           </a:p>
           <a:p>
             <a:pPr lvl="2" marL="1296000" indent="-288000">
-              <a:lnSpc>
-                <a:spcPct val="90000"/>
-              </a:lnSpc>
               <a:spcBef>
                 <a:spcPts val="850"/>
               </a:spcBef>
@@ -5477,26 +4868,17 @@
               <a:buChar char=""/>
             </a:pPr>
             <a:r>
-              <a:rPr b="0" lang="en-US" sz="1800" spc="-1" strike="noStrike">
-                <a:solidFill>
-                  <a:srgbClr val="000000"/>
-                </a:solidFill>
-                <a:latin typeface="Calibri"/>
+              <a:rPr b="0" lang="en-IN" sz="2400" spc="-1" strike="noStrike">
+                <a:latin typeface="Arial"/>
               </a:rPr>
               <a:t>Third Outline Level</a:t>
             </a:r>
-            <a:endParaRPr b="0" lang="en-US" sz="1800" spc="-1" strike="noStrike">
-              <a:solidFill>
-                <a:srgbClr val="000000"/>
-              </a:solidFill>
-              <a:latin typeface="Calibri"/>
+            <a:endParaRPr b="0" lang="en-IN" sz="2400" spc="-1" strike="noStrike">
+              <a:latin typeface="Arial"/>
             </a:endParaRPr>
           </a:p>
           <a:p>
             <a:pPr lvl="3" marL="1728000" indent="-216000">
-              <a:lnSpc>
-                <a:spcPct val="90000"/>
-              </a:lnSpc>
               <a:spcBef>
                 <a:spcPts val="567"/>
               </a:spcBef>
@@ -5508,26 +4890,17 @@
               <a:buChar char=""/>
             </a:pPr>
             <a:r>
-              <a:rPr b="0" lang="en-US" sz="1800" spc="-1" strike="noStrike">
-                <a:solidFill>
-                  <a:srgbClr val="000000"/>
-                </a:solidFill>
-                <a:latin typeface="Calibri"/>
+              <a:rPr b="0" lang="en-IN" sz="2000" spc="-1" strike="noStrike">
+                <a:latin typeface="Arial"/>
               </a:rPr>
               <a:t>Fourth Outline Level</a:t>
             </a:r>
-            <a:endParaRPr b="0" lang="en-US" sz="1800" spc="-1" strike="noStrike">
-              <a:solidFill>
-                <a:srgbClr val="000000"/>
-              </a:solidFill>
-              <a:latin typeface="Calibri"/>
+            <a:endParaRPr b="0" lang="en-IN" sz="2000" spc="-1" strike="noStrike">
+              <a:latin typeface="Arial"/>
             </a:endParaRPr>
           </a:p>
           <a:p>
             <a:pPr lvl="4" marL="2160000" indent="-216000">
-              <a:lnSpc>
-                <a:spcPct val="90000"/>
-              </a:lnSpc>
               <a:spcBef>
                 <a:spcPts val="283"/>
               </a:spcBef>
@@ -5539,26 +4912,17 @@
               <a:buChar char=""/>
             </a:pPr>
             <a:r>
-              <a:rPr b="0" lang="en-US" sz="2000" spc="-1" strike="noStrike">
-                <a:solidFill>
-                  <a:srgbClr val="000000"/>
-                </a:solidFill>
-                <a:latin typeface="Calibri"/>
+              <a:rPr b="0" lang="en-IN" sz="2000" spc="-1" strike="noStrike">
+                <a:latin typeface="Arial"/>
               </a:rPr>
               <a:t>Fifth Outline Level</a:t>
             </a:r>
-            <a:endParaRPr b="0" lang="en-US" sz="2000" spc="-1" strike="noStrike">
-              <a:solidFill>
-                <a:srgbClr val="000000"/>
-              </a:solidFill>
-              <a:latin typeface="Calibri"/>
+            <a:endParaRPr b="0" lang="en-IN" sz="2000" spc="-1" strike="noStrike">
+              <a:latin typeface="Arial"/>
             </a:endParaRPr>
           </a:p>
           <a:p>
             <a:pPr lvl="5" marL="2592000" indent="-216000">
-              <a:lnSpc>
-                <a:spcPct val="90000"/>
-              </a:lnSpc>
               <a:spcBef>
                 <a:spcPts val="283"/>
               </a:spcBef>
@@ -5570,26 +4934,17 @@
               <a:buChar char=""/>
             </a:pPr>
             <a:r>
-              <a:rPr b="0" lang="en-US" sz="2000" spc="-1" strike="noStrike">
-                <a:solidFill>
-                  <a:srgbClr val="000000"/>
-                </a:solidFill>
-                <a:latin typeface="Calibri"/>
+              <a:rPr b="0" lang="en-IN" sz="2000" spc="-1" strike="noStrike">
+                <a:latin typeface="Arial"/>
               </a:rPr>
               <a:t>Sixth Outline Level</a:t>
             </a:r>
-            <a:endParaRPr b="0" lang="en-US" sz="2000" spc="-1" strike="noStrike">
-              <a:solidFill>
-                <a:srgbClr val="000000"/>
-              </a:solidFill>
-              <a:latin typeface="Calibri"/>
+            <a:endParaRPr b="0" lang="en-IN" sz="2000" spc="-1" strike="noStrike">
+              <a:latin typeface="Arial"/>
             </a:endParaRPr>
           </a:p>
           <a:p>
             <a:pPr lvl="6" marL="3024000" indent="-216000">
-              <a:lnSpc>
-                <a:spcPct val="90000"/>
-              </a:lnSpc>
               <a:spcBef>
                 <a:spcPts val="283"/>
               </a:spcBef>
@@ -5601,19 +4956,13 @@
               <a:buChar char=""/>
             </a:pPr>
             <a:r>
-              <a:rPr b="0" lang="en-US" sz="2000" spc="-1" strike="noStrike">
-                <a:solidFill>
-                  <a:srgbClr val="000000"/>
-                </a:solidFill>
-                <a:latin typeface="Calibri"/>
+              <a:rPr b="0" lang="en-IN" sz="2000" spc="-1" strike="noStrike">
+                <a:latin typeface="Arial"/>
               </a:rPr>
               <a:t>Seventh Outline Level</a:t>
             </a:r>
-            <a:endParaRPr b="0" lang="en-US" sz="2000" spc="-1" strike="noStrike">
-              <a:solidFill>
-                <a:srgbClr val="000000"/>
-              </a:solidFill>
-              <a:latin typeface="Calibri"/>
+            <a:endParaRPr b="0" lang="en-IN" sz="2000" spc="-1" strike="noStrike">
+              <a:latin typeface="Arial"/>
             </a:endParaRPr>
           </a:p>
         </p:txBody>
@@ -5669,28 +5018,85 @@
             <a:spLocks noGrp="1"/>
           </p:cNvSpPr>
           <p:nvPr>
-            <p:ph type="dt" idx="4"/>
-          </p:nvPr>
-        </p:nvSpPr>
-        <p:spPr>
-          <a:xfrm>
-            <a:off x="838080" y="6356520"/>
-            <a:ext cx="2742840" cy="364680"/>
-          </a:xfrm>
-          <a:prstGeom prst="rect">
-            <a:avLst/>
-          </a:prstGeom>
-          <a:noFill/>
-          <a:ln w="0">
-            <a:noFill/>
-          </a:ln>
-        </p:spPr>
-        <p:txBody>
-          <a:bodyPr anchor="ctr">
+            <p:ph type="ftr" idx="4"/>
+          </p:nvPr>
+        </p:nvSpPr>
+        <p:spPr>
+          <a:xfrm>
+            <a:off x="4038480" y="6356520"/>
+            <a:ext cx="4114080" cy="364320"/>
+          </a:xfrm>
+          <a:prstGeom prst="rect">
+            <a:avLst/>
+          </a:prstGeom>
+          <a:noFill/>
+          <a:ln w="0">
+            <a:noFill/>
+          </a:ln>
+        </p:spPr>
+        <p:txBody>
+          <a:bodyPr lIns="90000" rIns="90000" tIns="45000" bIns="45000" anchor="ctr">
             <a:noAutofit/>
           </a:bodyPr>
           <a:lstStyle>
-            <a:lvl1pPr>
+            <a:lvl1pPr algn="ctr">
+              <a:lnSpc>
+                <a:spcPct val="100000"/>
+              </a:lnSpc>
+              <a:buNone/>
+              <a:defRPr b="0" lang="en-IN" sz="1400" spc="-1" strike="noStrike">
+                <a:latin typeface="Times New Roman"/>
+              </a:defRPr>
+            </a:lvl1pPr>
+          </a:lstStyle>
+          <a:p>
+            <a:pPr algn="ctr">
+              <a:lnSpc>
+                <a:spcPct val="100000"/>
+              </a:lnSpc>
+              <a:buNone/>
+            </a:pPr>
+            <a:r>
+              <a:rPr b="0" lang="en-IN" sz="1400" spc="-1" strike="noStrike">
+                <a:latin typeface="Times New Roman"/>
+              </a:rPr>
+              <a:t>&lt;footer&gt;</a:t>
+            </a:r>
+            <a:endParaRPr b="0" lang="en-IN" sz="1400" spc="-1" strike="noStrike">
+              <a:latin typeface="Times New Roman"/>
+            </a:endParaRPr>
+          </a:p>
+        </p:txBody>
+      </p:sp>
+      <p:sp>
+        <p:nvSpPr>
+          <p:cNvPr id="42" name="PlaceHolder 2"/>
+          <p:cNvSpPr>
+            <a:spLocks noGrp="1"/>
+          </p:cNvSpPr>
+          <p:nvPr>
+            <p:ph type="sldNum" idx="5"/>
+          </p:nvPr>
+        </p:nvSpPr>
+        <p:spPr>
+          <a:xfrm>
+            <a:off x="8610480" y="6356520"/>
+            <a:ext cx="2742480" cy="364320"/>
+          </a:xfrm>
+          <a:prstGeom prst="rect">
+            <a:avLst/>
+          </a:prstGeom>
+          <a:noFill/>
+          <a:ln w="0">
+            <a:noFill/>
+          </a:ln>
+        </p:spPr>
+        <p:txBody>
+          <a:bodyPr lIns="90000" rIns="90000" tIns="45000" bIns="45000" anchor="ctr">
+            <a:noAutofit/>
+          </a:bodyPr>
+          <a:lstStyle>
+            <a:lvl1pPr algn="r">
               <a:lnSpc>
                 <a:spcPct val="100000"/>
               </a:lnSpc>
@@ -5704,127 +5110,13 @@
             </a:lvl1pPr>
           </a:lstStyle>
           <a:p>
-            <a:pPr>
-              <a:lnSpc>
-                <a:spcPct val="100000"/>
-              </a:lnSpc>
-              <a:buNone/>
-            </a:pPr>
-            <a:r>
-              <a:rPr b="0" lang="en-IN" sz="1200" spc="-1" strike="noStrike">
-                <a:solidFill>
-                  <a:srgbClr val="8b8b8b"/>
-                </a:solidFill>
-                <a:latin typeface="Calibri"/>
-              </a:rPr>
-              <a:t>&lt;date/time&gt;</a:t>
-            </a:r>
-            <a:endParaRPr b="0" lang="en-IN" sz="1200" spc="-1" strike="noStrike">
-              <a:latin typeface="Times New Roman"/>
-            </a:endParaRPr>
-          </a:p>
-        </p:txBody>
-      </p:sp>
-      <p:sp>
-        <p:nvSpPr>
-          <p:cNvPr id="42" name="PlaceHolder 2"/>
-          <p:cNvSpPr>
-            <a:spLocks noGrp="1"/>
-          </p:cNvSpPr>
-          <p:nvPr>
-            <p:ph type="ftr" idx="5"/>
-          </p:nvPr>
-        </p:nvSpPr>
-        <p:spPr>
-          <a:xfrm>
-            <a:off x="4038480" y="6356520"/>
-            <a:ext cx="4114440" cy="364680"/>
-          </a:xfrm>
-          <a:prstGeom prst="rect">
-            <a:avLst/>
-          </a:prstGeom>
-          <a:noFill/>
-          <a:ln w="0">
-            <a:noFill/>
-          </a:ln>
-        </p:spPr>
-        <p:txBody>
-          <a:bodyPr anchor="ctr">
-            <a:noAutofit/>
-          </a:bodyPr>
-          <a:lstStyle>
-            <a:lvl1pPr algn="ctr">
-              <a:buNone/>
-              <a:defRPr b="0" lang="en-IN" sz="1400" spc="-1" strike="noStrike">
-                <a:latin typeface="Times New Roman"/>
-              </a:defRPr>
-            </a:lvl1pPr>
-          </a:lstStyle>
-          <a:p>
-            <a:pPr algn="ctr">
-              <a:buNone/>
-            </a:pPr>
-            <a:r>
-              <a:rPr b="0" lang="en-IN" sz="1400" spc="-1" strike="noStrike">
-                <a:latin typeface="Times New Roman"/>
-              </a:rPr>
-              <a:t>&lt;footer&gt;</a:t>
-            </a:r>
-            <a:endParaRPr b="0" lang="en-IN" sz="1400" spc="-1" strike="noStrike">
-              <a:latin typeface="Times New Roman"/>
-            </a:endParaRPr>
-          </a:p>
-        </p:txBody>
-      </p:sp>
-      <p:sp>
-        <p:nvSpPr>
-          <p:cNvPr id="43" name="PlaceHolder 3"/>
-          <p:cNvSpPr>
-            <a:spLocks noGrp="1"/>
-          </p:cNvSpPr>
-          <p:nvPr>
-            <p:ph type="sldNum" idx="6"/>
-          </p:nvPr>
-        </p:nvSpPr>
-        <p:spPr>
-          <a:xfrm>
-            <a:off x="8610480" y="6356520"/>
-            <a:ext cx="2742840" cy="364680"/>
-          </a:xfrm>
-          <a:prstGeom prst="rect">
-            <a:avLst/>
-          </a:prstGeom>
-          <a:noFill/>
-          <a:ln w="0">
-            <a:noFill/>
-          </a:ln>
-        </p:spPr>
-        <p:txBody>
-          <a:bodyPr anchor="ctr">
-            <a:noAutofit/>
-          </a:bodyPr>
-          <a:lstStyle>
-            <a:lvl1pPr algn="r">
-              <a:lnSpc>
-                <a:spcPct val="100000"/>
-              </a:lnSpc>
-              <a:buNone/>
-              <a:defRPr b="0" lang="en-IN" sz="1200" spc="-1" strike="noStrike">
-                <a:solidFill>
-                  <a:srgbClr val="8b8b8b"/>
-                </a:solidFill>
-                <a:latin typeface="Calibri"/>
-              </a:defRPr>
-            </a:lvl1pPr>
-          </a:lstStyle>
-          <a:p>
             <a:pPr algn="r">
               <a:lnSpc>
                 <a:spcPct val="100000"/>
               </a:lnSpc>
               <a:buNone/>
             </a:pPr>
-            <a:fld id="{E589676D-29E9-4ED9-9A05-22967A00436F}" type="slidenum">
+            <a:fld id="{17BEBB94-F4C0-46BD-96B5-645789D2143F}" type="slidenum">
               <a:rPr b="0" lang="en-IN" sz="1200" spc="-1" strike="noStrike">
                 <a:solidFill>
                   <a:srgbClr val="8b8b8b"/>
@@ -5841,6 +5133,53 @@
       </p:sp>
       <p:sp>
         <p:nvSpPr>
+          <p:cNvPr id="43" name="PlaceHolder 3"/>
+          <p:cNvSpPr>
+            <a:spLocks noGrp="1"/>
+          </p:cNvSpPr>
+          <p:nvPr>
+            <p:ph type="dt" idx="6"/>
+          </p:nvPr>
+        </p:nvSpPr>
+        <p:spPr>
+          <a:xfrm>
+            <a:off x="838080" y="6356520"/>
+            <a:ext cx="2742480" cy="364320"/>
+          </a:xfrm>
+          <a:prstGeom prst="rect">
+            <a:avLst/>
+          </a:prstGeom>
+          <a:noFill/>
+          <a:ln w="0">
+            <a:noFill/>
+          </a:ln>
+        </p:spPr>
+        <p:txBody>
+          <a:bodyPr lIns="90000" rIns="90000" tIns="45000" bIns="45000" anchor="ctr">
+            <a:noAutofit/>
+          </a:bodyPr>
+          <a:lstStyle>
+            <a:lvl1pPr>
+              <a:defRPr b="0" lang="en-IN" sz="1400" spc="-1" strike="noStrike">
+                <a:latin typeface="Times New Roman"/>
+              </a:defRPr>
+            </a:lvl1pPr>
+          </a:lstStyle>
+          <a:p>
+            <a:r>
+              <a:rPr b="0" lang="en-IN" sz="1400" spc="-1" strike="noStrike">
+                <a:latin typeface="Times New Roman"/>
+              </a:rPr>
+              <a:t>&lt;date/time&gt;</a:t>
+            </a:r>
+            <a:endParaRPr b="0" lang="en-IN" sz="1400" spc="-1" strike="noStrike">
+              <a:latin typeface="Times New Roman"/>
+            </a:endParaRPr>
+          </a:p>
+        </p:txBody>
+      </p:sp>
+      <p:sp>
+        <p:nvSpPr>
           <p:cNvPr id="44" name="PlaceHolder 4"/>
           <p:cNvSpPr>
             <a:spLocks noGrp="1"/>
@@ -5867,20 +5206,17 @@
             <a:noAutofit/>
           </a:bodyPr>
           <a:p>
-            <a:r>
-              <a:rPr b="0" lang="en-US" sz="1800" spc="-1" strike="noStrike">
-                <a:solidFill>
-                  <a:srgbClr val="000000"/>
-                </a:solidFill>
-                <a:latin typeface="Calibri"/>
+            <a:pPr algn="ctr">
+              <a:buNone/>
+            </a:pPr>
+            <a:r>
+              <a:rPr b="0" lang="en-IN" sz="4400" spc="-1" strike="noStrike">
+                <a:latin typeface="Arial"/>
               </a:rPr>
               <a:t>Click to edit the title text format</a:t>
             </a:r>
-            <a:endParaRPr b="0" lang="en-US" sz="1800" spc="-1" strike="noStrike">
-              <a:solidFill>
-                <a:srgbClr val="000000"/>
-              </a:solidFill>
-              <a:latin typeface="Calibri"/>
+            <a:endParaRPr b="0" lang="en-IN" sz="4400" spc="-1" strike="noStrike">
+              <a:latin typeface="Arial"/>
             </a:endParaRPr>
           </a:p>
         </p:txBody>
@@ -5914,9 +5250,6 @@
           </a:bodyPr>
           <a:p>
             <a:pPr marL="432000" indent="-324000">
-              <a:lnSpc>
-                <a:spcPct val="90000"/>
-              </a:lnSpc>
               <a:spcBef>
                 <a:spcPts val="1417"/>
               </a:spcBef>
@@ -5928,26 +5261,17 @@
               <a:buChar char=""/>
             </a:pPr>
             <a:r>
-              <a:rPr b="0" lang="en-US" sz="2800" spc="-1" strike="noStrike">
-                <a:solidFill>
-                  <a:srgbClr val="000000"/>
-                </a:solidFill>
-                <a:latin typeface="Calibri"/>
+              <a:rPr b="0" lang="en-IN" sz="3200" spc="-1" strike="noStrike">
+                <a:latin typeface="Arial"/>
               </a:rPr>
               <a:t>Click to edit the outline text format</a:t>
             </a:r>
-            <a:endParaRPr b="0" lang="en-US" sz="2800" spc="-1" strike="noStrike">
-              <a:solidFill>
-                <a:srgbClr val="000000"/>
-              </a:solidFill>
-              <a:latin typeface="Calibri"/>
+            <a:endParaRPr b="0" lang="en-IN" sz="3200" spc="-1" strike="noStrike">
+              <a:latin typeface="Arial"/>
             </a:endParaRPr>
           </a:p>
           <a:p>
             <a:pPr lvl="1" marL="864000" indent="-324000">
-              <a:lnSpc>
-                <a:spcPct val="90000"/>
-              </a:lnSpc>
               <a:spcBef>
                 <a:spcPts val="1134"/>
               </a:spcBef>
@@ -5959,26 +5283,17 @@
               <a:buChar char=""/>
             </a:pPr>
             <a:r>
-              <a:rPr b="0" lang="en-US" sz="2000" spc="-1" strike="noStrike">
-                <a:solidFill>
-                  <a:srgbClr val="000000"/>
-                </a:solidFill>
-                <a:latin typeface="Calibri"/>
+              <a:rPr b="0" lang="en-IN" sz="2800" spc="-1" strike="noStrike">
+                <a:latin typeface="Arial"/>
               </a:rPr>
               <a:t>Second Outline Level</a:t>
             </a:r>
-            <a:endParaRPr b="0" lang="en-US" sz="2000" spc="-1" strike="noStrike">
-              <a:solidFill>
-                <a:srgbClr val="000000"/>
-              </a:solidFill>
-              <a:latin typeface="Calibri"/>
+            <a:endParaRPr b="0" lang="en-IN" sz="2800" spc="-1" strike="noStrike">
+              <a:latin typeface="Arial"/>
             </a:endParaRPr>
           </a:p>
           <a:p>
             <a:pPr lvl="2" marL="1296000" indent="-288000">
-              <a:lnSpc>
-                <a:spcPct val="90000"/>
-              </a:lnSpc>
               <a:spcBef>
                 <a:spcPts val="850"/>
               </a:spcBef>
@@ -5990,26 +5305,17 @@
               <a:buChar char=""/>
             </a:pPr>
             <a:r>
-              <a:rPr b="0" lang="en-US" sz="1800" spc="-1" strike="noStrike">
-                <a:solidFill>
-                  <a:srgbClr val="000000"/>
-                </a:solidFill>
-                <a:latin typeface="Calibri"/>
+              <a:rPr b="0" lang="en-IN" sz="2400" spc="-1" strike="noStrike">
+                <a:latin typeface="Arial"/>
               </a:rPr>
               <a:t>Third Outline Level</a:t>
             </a:r>
-            <a:endParaRPr b="0" lang="en-US" sz="1800" spc="-1" strike="noStrike">
-              <a:solidFill>
-                <a:srgbClr val="000000"/>
-              </a:solidFill>
-              <a:latin typeface="Calibri"/>
+            <a:endParaRPr b="0" lang="en-IN" sz="2400" spc="-1" strike="noStrike">
+              <a:latin typeface="Arial"/>
             </a:endParaRPr>
           </a:p>
           <a:p>
             <a:pPr lvl="3" marL="1728000" indent="-216000">
-              <a:lnSpc>
-                <a:spcPct val="90000"/>
-              </a:lnSpc>
               <a:spcBef>
                 <a:spcPts val="567"/>
               </a:spcBef>
@@ -6021,26 +5327,17 @@
               <a:buChar char=""/>
             </a:pPr>
             <a:r>
-              <a:rPr b="0" lang="en-US" sz="1800" spc="-1" strike="noStrike">
-                <a:solidFill>
-                  <a:srgbClr val="000000"/>
-                </a:solidFill>
-                <a:latin typeface="Calibri"/>
+              <a:rPr b="0" lang="en-IN" sz="2000" spc="-1" strike="noStrike">
+                <a:latin typeface="Arial"/>
               </a:rPr>
               <a:t>Fourth Outline Level</a:t>
             </a:r>
-            <a:endParaRPr b="0" lang="en-US" sz="1800" spc="-1" strike="noStrike">
-              <a:solidFill>
-                <a:srgbClr val="000000"/>
-              </a:solidFill>
-              <a:latin typeface="Calibri"/>
+            <a:endParaRPr b="0" lang="en-IN" sz="2000" spc="-1" strike="noStrike">
+              <a:latin typeface="Arial"/>
             </a:endParaRPr>
           </a:p>
           <a:p>
             <a:pPr lvl="4" marL="2160000" indent="-216000">
-              <a:lnSpc>
-                <a:spcPct val="90000"/>
-              </a:lnSpc>
               <a:spcBef>
                 <a:spcPts val="283"/>
               </a:spcBef>
@@ -6052,26 +5349,17 @@
               <a:buChar char=""/>
             </a:pPr>
             <a:r>
-              <a:rPr b="0" lang="en-US" sz="2000" spc="-1" strike="noStrike">
-                <a:solidFill>
-                  <a:srgbClr val="000000"/>
-                </a:solidFill>
-                <a:latin typeface="Calibri"/>
+              <a:rPr b="0" lang="en-IN" sz="2000" spc="-1" strike="noStrike">
+                <a:latin typeface="Arial"/>
               </a:rPr>
               <a:t>Fifth Outline Level</a:t>
             </a:r>
-            <a:endParaRPr b="0" lang="en-US" sz="2000" spc="-1" strike="noStrike">
-              <a:solidFill>
-                <a:srgbClr val="000000"/>
-              </a:solidFill>
-              <a:latin typeface="Calibri"/>
+            <a:endParaRPr b="0" lang="en-IN" sz="2000" spc="-1" strike="noStrike">
+              <a:latin typeface="Arial"/>
             </a:endParaRPr>
           </a:p>
           <a:p>
             <a:pPr lvl="5" marL="2592000" indent="-216000">
-              <a:lnSpc>
-                <a:spcPct val="90000"/>
-              </a:lnSpc>
               <a:spcBef>
                 <a:spcPts val="283"/>
               </a:spcBef>
@@ -6083,26 +5371,17 @@
               <a:buChar char=""/>
             </a:pPr>
             <a:r>
-              <a:rPr b="0" lang="en-US" sz="2000" spc="-1" strike="noStrike">
-                <a:solidFill>
-                  <a:srgbClr val="000000"/>
-                </a:solidFill>
-                <a:latin typeface="Calibri"/>
+              <a:rPr b="0" lang="en-IN" sz="2000" spc="-1" strike="noStrike">
+                <a:latin typeface="Arial"/>
               </a:rPr>
               <a:t>Sixth Outline Level</a:t>
             </a:r>
-            <a:endParaRPr b="0" lang="en-US" sz="2000" spc="-1" strike="noStrike">
-              <a:solidFill>
-                <a:srgbClr val="000000"/>
-              </a:solidFill>
-              <a:latin typeface="Calibri"/>
+            <a:endParaRPr b="0" lang="en-IN" sz="2000" spc="-1" strike="noStrike">
+              <a:latin typeface="Arial"/>
             </a:endParaRPr>
           </a:p>
           <a:p>
             <a:pPr lvl="6" marL="3024000" indent="-216000">
-              <a:lnSpc>
-                <a:spcPct val="90000"/>
-              </a:lnSpc>
               <a:spcBef>
                 <a:spcPts val="283"/>
               </a:spcBef>
@@ -6114,19 +5393,13 @@
               <a:buChar char=""/>
             </a:pPr>
             <a:r>
-              <a:rPr b="0" lang="en-US" sz="2000" spc="-1" strike="noStrike">
-                <a:solidFill>
-                  <a:srgbClr val="000000"/>
-                </a:solidFill>
-                <a:latin typeface="Calibri"/>
+              <a:rPr b="0" lang="en-IN" sz="2000" spc="-1" strike="noStrike">
+                <a:latin typeface="Arial"/>
               </a:rPr>
               <a:t>Seventh Outline Level</a:t>
             </a:r>
-            <a:endParaRPr b="0" lang="en-US" sz="2000" spc="-1" strike="noStrike">
-              <a:solidFill>
-                <a:srgbClr val="000000"/>
-              </a:solidFill>
-              <a:latin typeface="Calibri"/>
+            <a:endParaRPr b="0" lang="en-IN" sz="2000" spc="-1" strike="noStrike">
+              <a:latin typeface="Arial"/>
             </a:endParaRPr>
           </a:p>
         </p:txBody>
@@ -6181,18 +5454,18 @@
         <p:spPr>
           <a:xfrm>
             <a:off x="1408680" y="2547720"/>
-            <a:ext cx="9143640" cy="880920"/>
-          </a:xfrm>
-          <a:prstGeom prst="rect">
-            <a:avLst/>
-          </a:prstGeom>
-          <a:noFill/>
-          <a:ln w="0">
-            <a:noFill/>
-          </a:ln>
-        </p:spPr>
-        <p:txBody>
-          <a:bodyPr anchor="b">
+            <a:ext cx="9143280" cy="880560"/>
+          </a:xfrm>
+          <a:prstGeom prst="rect">
+            <a:avLst/>
+          </a:prstGeom>
+          <a:noFill/>
+          <a:ln w="0">
+            <a:noFill/>
+          </a:ln>
+        </p:spPr>
+        <p:txBody>
+          <a:bodyPr lIns="0" rIns="0" tIns="0" bIns="0" anchor="b">
             <a:normAutofit/>
           </a:bodyPr>
           <a:p>
@@ -6211,11 +5484,8 @@
               </a:rPr>
               <a:t>find command</a:t>
             </a:r>
-            <a:endParaRPr b="0" lang="en-US" sz="4800" spc="-1" strike="noStrike">
-              <a:solidFill>
-                <a:srgbClr val="000000"/>
-              </a:solidFill>
-              <a:latin typeface="Calibri"/>
+            <a:endParaRPr b="0" lang="en-IN" sz="4800" spc="-1" strike="noStrike">
+              <a:latin typeface="Arial"/>
             </a:endParaRPr>
           </a:p>
         </p:txBody>
@@ -6263,7 +5533,7 @@
         <p:spPr>
           <a:xfrm>
             <a:off x="2520" y="-108360"/>
-            <a:ext cx="12191400" cy="6857640"/>
+            <a:ext cx="12191040" cy="6857280"/>
           </a:xfrm>
           <a:prstGeom prst="rect">
             <a:avLst/>
@@ -6273,6 +5543,452 @@
           </a:ln>
         </p:spPr>
       </p:pic>
+    </p:spTree>
+  </p:cSld>
+  <mc:AlternateContent>
+    <mc:Choice Requires="p14">
+      <p:transition spd="slow" p14:dur="2000"/>
+    </mc:Choice>
+    <mc:Fallback>
+      <p:transition spd="slow"/>
+    </mc:Fallback>
+  </mc:AlternateContent>
+</p:sld>
+</file>
+
+<file path=ppt/slides/slide11.xml><?xml version="1.0" encoding="utf-8"?>
+<p:sld xmlns:a="http://schemas.openxmlformats.org/drawingml/2006/main" xmlns:p="http://schemas.openxmlformats.org/presentationml/2006/main" xmlns:r="http://schemas.openxmlformats.org/officeDocument/2006/relationships" xmlns:p14="http://schemas.microsoft.com/office/powerpoint/2010/main" xmlns:p15="http://schemas.microsoft.com/office/powerpoint/2012/main" xmlns:mc="http://schemas.openxmlformats.org/markup-compatibility/2006">
+  <p:cSld>
+    <p:spTree>
+      <p:nvGrpSpPr>
+        <p:cNvPr id="1" name=""/>
+        <p:cNvGrpSpPr/>
+        <p:nvPr/>
+      </p:nvGrpSpPr>
+      <p:grpSpPr>
+        <a:xfrm>
+          <a:off x="0" y="0"/>
+          <a:ext cx="0" cy="0"/>
+          <a:chOff x="0" y="0"/>
+          <a:chExt cx="0" cy="0"/>
+        </a:xfrm>
+      </p:grpSpPr>
+      <p:graphicFrame>
+        <p:nvGraphicFramePr>
+          <p:cNvPr id="103" name=""/>
+          <p:cNvGraphicFramePr/>
+          <p:nvPr/>
+        </p:nvGraphicFramePr>
+        <p:xfrm>
+          <a:off x="2731320" y="2443680"/>
+          <a:ext cx="10080000" cy="2159280"/>
+        </p:xfrm>
+        <a:graphic>
+          <a:graphicData uri="http://schemas.openxmlformats.org/drawingml/2006/table">
+            <a:tbl>
+              <a:tblPr/>
+              <a:tblGrid>
+                <a:gridCol w="2015280"/>
+                <a:gridCol w="2015280"/>
+                <a:gridCol w="2018880"/>
+              </a:tblGrid>
+              <a:tr h="719640">
+                <a:tc>
+                  <a:txBody>
+                    <a:bodyPr lIns="90000" rIns="90000" tIns="46800" bIns="46800" anchor="t">
+                      <a:noAutofit/>
+                    </a:bodyPr>
+                    <a:p>
+                      <a:r>
+                        <a:rPr b="0" lang="en-IN" sz="1800" spc="-1" strike="noStrike">
+                          <a:latin typeface="Arial"/>
+                        </a:rPr>
+                        <a:t>Dummy 1,1</a:t>
+                      </a:r>
+                      <a:endParaRPr b="0" lang="en-IN" sz="1800" spc="-1" strike="noStrike">
+                        <a:latin typeface="Arial"/>
+                      </a:endParaRPr>
+                    </a:p>
+                  </a:txBody>
+                  <a:tcPr anchor="t" marL="90000" marR="90000">
+                    <a:lnL w="720">
+                      <a:solidFill>
+                        <a:srgbClr val="ffffff"/>
+                      </a:solidFill>
+                    </a:lnL>
+                    <a:lnR w="720">
+                      <a:solidFill>
+                        <a:srgbClr val="ffffff"/>
+                      </a:solidFill>
+                    </a:lnR>
+                    <a:lnT w="720">
+                      <a:solidFill>
+                        <a:srgbClr val="ffffff"/>
+                      </a:solidFill>
+                    </a:lnT>
+                    <a:lnB w="720">
+                      <a:solidFill>
+                        <a:srgbClr val="ffffff"/>
+                      </a:solidFill>
+                    </a:lnB>
+                    <a:solidFill>
+                      <a:srgbClr val="b3b3b3"/>
+                    </a:solidFill>
+                  </a:tcPr>
+                </a:tc>
+                <a:tc>
+                  <a:txBody>
+                    <a:bodyPr lIns="90000" rIns="90000" tIns="46800" bIns="46800" anchor="t">
+                      <a:noAutofit/>
+                    </a:bodyPr>
+                    <a:p>
+                      <a:r>
+                        <a:rPr b="0" lang="en-IN" sz="1800" spc="-1" strike="noStrike">
+                          <a:latin typeface="Arial"/>
+                        </a:rPr>
+                        <a:t>Dummy 1,2</a:t>
+                      </a:r>
+                      <a:endParaRPr b="0" lang="en-IN" sz="1800" spc="-1" strike="noStrike">
+                        <a:latin typeface="Arial"/>
+                      </a:endParaRPr>
+                    </a:p>
+                  </a:txBody>
+                  <a:tcPr anchor="t" marL="90000" marR="90000">
+                    <a:lnL w="720">
+                      <a:solidFill>
+                        <a:srgbClr val="ffffff"/>
+                      </a:solidFill>
+                    </a:lnL>
+                    <a:lnR w="720">
+                      <a:solidFill>
+                        <a:srgbClr val="ffffff"/>
+                      </a:solidFill>
+                    </a:lnR>
+                    <a:lnT w="720">
+                      <a:solidFill>
+                        <a:srgbClr val="ffffff"/>
+                      </a:solidFill>
+                    </a:lnT>
+                    <a:lnB w="720">
+                      <a:solidFill>
+                        <a:srgbClr val="ffffff"/>
+                      </a:solidFill>
+                    </a:lnB>
+                    <a:solidFill>
+                      <a:srgbClr val="b3b3b3"/>
+                    </a:solidFill>
+                  </a:tcPr>
+                </a:tc>
+                <a:tc>
+                  <a:txBody>
+                    <a:bodyPr lIns="90000" rIns="90000" tIns="46800" bIns="46800" anchor="t">
+                      <a:noAutofit/>
+                    </a:bodyPr>
+                    <a:p>
+                      <a:r>
+                        <a:rPr b="0" lang="en-IN" sz="1800" spc="-1" strike="noStrike">
+                          <a:latin typeface="Arial"/>
+                        </a:rPr>
+                        <a:t>Dummy 1,3</a:t>
+                      </a:r>
+                      <a:endParaRPr b="0" lang="en-IN" sz="1800" spc="-1" strike="noStrike">
+                        <a:latin typeface="Arial"/>
+                      </a:endParaRPr>
+                    </a:p>
+                  </a:txBody>
+                  <a:tcPr anchor="t" marL="90000" marR="90000">
+                    <a:lnL w="720">
+                      <a:solidFill>
+                        <a:srgbClr val="ffffff"/>
+                      </a:solidFill>
+                    </a:lnL>
+                    <a:lnR w="720">
+                      <a:solidFill>
+                        <a:srgbClr val="ffffff"/>
+                      </a:solidFill>
+                    </a:lnR>
+                    <a:lnT w="720">
+                      <a:solidFill>
+                        <a:srgbClr val="ffffff"/>
+                      </a:solidFill>
+                    </a:lnT>
+                    <a:lnB w="720">
+                      <a:solidFill>
+                        <a:srgbClr val="ffffff"/>
+                      </a:solidFill>
+                    </a:lnB>
+                    <a:solidFill>
+                      <a:srgbClr val="b3b3b3"/>
+                    </a:solidFill>
+                  </a:tcPr>
+                </a:tc>
+              </a:tr>
+              <a:tr h="719640">
+                <a:tc>
+                  <a:txBody>
+                    <a:bodyPr lIns="90000" rIns="90000" tIns="46800" bIns="46800" anchor="t">
+                      <a:noAutofit/>
+                    </a:bodyPr>
+                    <a:p>
+                      <a:r>
+                        <a:rPr b="0" lang="en-IN" sz="1800" spc="-1" strike="noStrike">
+                          <a:latin typeface="Arial"/>
+                        </a:rPr>
+                        <a:t>Dummy 2,1</a:t>
+                      </a:r>
+                      <a:endParaRPr b="0" lang="en-IN" sz="1800" spc="-1" strike="noStrike">
+                        <a:latin typeface="Arial"/>
+                      </a:endParaRPr>
+                    </a:p>
+                  </a:txBody>
+                  <a:tcPr anchor="t" marL="90000" marR="90000">
+                    <a:lnL w="720">
+                      <a:solidFill>
+                        <a:srgbClr val="ffffff"/>
+                      </a:solidFill>
+                    </a:lnL>
+                    <a:lnR w="720">
+                      <a:solidFill>
+                        <a:srgbClr val="ffffff"/>
+                      </a:solidFill>
+                    </a:lnR>
+                    <a:lnT w="720">
+                      <a:solidFill>
+                        <a:srgbClr val="ffffff"/>
+                      </a:solidFill>
+                    </a:lnT>
+                    <a:lnB w="720">
+                      <a:solidFill>
+                        <a:srgbClr val="ffffff"/>
+                      </a:solidFill>
+                    </a:lnB>
+                    <a:solidFill>
+                      <a:srgbClr val="cccccc"/>
+                    </a:solidFill>
+                  </a:tcPr>
+                </a:tc>
+                <a:tc>
+                  <a:txBody>
+                    <a:bodyPr lIns="90000" rIns="90000" tIns="46800" bIns="46800" anchor="t">
+                      <a:noAutofit/>
+                    </a:bodyPr>
+                    <a:p>
+                      <a:r>
+                        <a:rPr b="0" lang="en-IN" sz="1800" spc="-1" strike="noStrike">
+                          <a:latin typeface="Arial"/>
+                        </a:rPr>
+                        <a:t>Dummy 2,2</a:t>
+                      </a:r>
+                      <a:endParaRPr b="0" lang="en-IN" sz="1800" spc="-1" strike="noStrike">
+                        <a:latin typeface="Arial"/>
+                      </a:endParaRPr>
+                    </a:p>
+                  </a:txBody>
+                  <a:tcPr anchor="t" marL="90000" marR="90000">
+                    <a:lnL w="720">
+                      <a:solidFill>
+                        <a:srgbClr val="ffffff"/>
+                      </a:solidFill>
+                    </a:lnL>
+                    <a:lnR w="720">
+                      <a:solidFill>
+                        <a:srgbClr val="ffffff"/>
+                      </a:solidFill>
+                    </a:lnR>
+                    <a:lnT w="720">
+                      <a:solidFill>
+                        <a:srgbClr val="ffffff"/>
+                      </a:solidFill>
+                    </a:lnT>
+                    <a:lnB w="720">
+                      <a:solidFill>
+                        <a:srgbClr val="ffffff"/>
+                      </a:solidFill>
+                    </a:lnB>
+                    <a:solidFill>
+                      <a:srgbClr val="cccccc"/>
+                    </a:solidFill>
+                  </a:tcPr>
+                </a:tc>
+                <a:tc>
+                  <a:txBody>
+                    <a:bodyPr lIns="90000" rIns="90000" tIns="46800" bIns="46800" anchor="t">
+                      <a:noAutofit/>
+                    </a:bodyPr>
+                    <a:p>
+                      <a:r>
+                        <a:rPr b="0" lang="en-IN" sz="1800" spc="-1" strike="noStrike">
+                          <a:latin typeface="Arial"/>
+                        </a:rPr>
+                        <a:t>Dummy 2,3</a:t>
+                      </a:r>
+                      <a:endParaRPr b="0" lang="en-IN" sz="1800" spc="-1" strike="noStrike">
+                        <a:latin typeface="Arial"/>
+                      </a:endParaRPr>
+                    </a:p>
+                  </a:txBody>
+                  <a:tcPr anchor="t" marL="90000" marR="90000">
+                    <a:lnL w="720">
+                      <a:solidFill>
+                        <a:srgbClr val="ffffff"/>
+                      </a:solidFill>
+                    </a:lnL>
+                    <a:lnR w="720">
+                      <a:solidFill>
+                        <a:srgbClr val="ffffff"/>
+                      </a:solidFill>
+                    </a:lnR>
+                    <a:lnT w="720">
+                      <a:solidFill>
+                        <a:srgbClr val="ffffff"/>
+                      </a:solidFill>
+                    </a:lnT>
+                    <a:lnB w="720">
+                      <a:solidFill>
+                        <a:srgbClr val="ffffff"/>
+                      </a:solidFill>
+                    </a:lnB>
+                    <a:solidFill>
+                      <a:srgbClr val="cccccc"/>
+                    </a:solidFill>
+                  </a:tcPr>
+                </a:tc>
+              </a:tr>
+              <a:tr h="720360">
+                <a:tc>
+                  <a:txBody>
+                    <a:bodyPr lIns="90000" rIns="90000" tIns="46800" bIns="46800" anchor="t">
+                      <a:noAutofit/>
+                    </a:bodyPr>
+                    <a:p>
+                      <a:r>
+                        <a:rPr b="0" lang="en-IN" sz="1800" spc="-1" strike="noStrike">
+                          <a:latin typeface="Arial"/>
+                        </a:rPr>
+                        <a:t>Dummy 2,2</a:t>
+                      </a:r>
+                      <a:endParaRPr b="0" lang="en-IN" sz="1800" spc="-1" strike="noStrike">
+                        <a:latin typeface="Arial"/>
+                      </a:endParaRPr>
+                    </a:p>
+                  </a:txBody>
+                  <a:tcPr anchor="t" marL="90000" marR="90000">
+                    <a:lnL w="720">
+                      <a:solidFill>
+                        <a:srgbClr val="ffffff"/>
+                      </a:solidFill>
+                    </a:lnL>
+                    <a:lnR w="720">
+                      <a:solidFill>
+                        <a:srgbClr val="ffffff"/>
+                      </a:solidFill>
+                    </a:lnR>
+                    <a:lnT w="720">
+                      <a:solidFill>
+                        <a:srgbClr val="ffffff"/>
+                      </a:solidFill>
+                    </a:lnT>
+                    <a:lnB w="720">
+                      <a:solidFill>
+                        <a:srgbClr val="ffffff"/>
+                      </a:solidFill>
+                    </a:lnB>
+                    <a:solidFill>
+                      <a:srgbClr val="e6e6e6"/>
+                    </a:solidFill>
+                  </a:tcPr>
+                </a:tc>
+                <a:tc>
+                  <a:txBody>
+                    <a:bodyPr lIns="90000" rIns="90000" tIns="46800" bIns="46800" anchor="t">
+                      <a:noAutofit/>
+                    </a:bodyPr>
+                    <a:p>
+                      <a:r>
+                        <a:rPr b="0" lang="en-IN" sz="1800" spc="-1" strike="noStrike">
+                          <a:latin typeface="Arial"/>
+                        </a:rPr>
+                        <a:t>Dummy 3,2</a:t>
+                      </a:r>
+                      <a:endParaRPr b="0" lang="en-IN" sz="1800" spc="-1" strike="noStrike">
+                        <a:latin typeface="Arial"/>
+                      </a:endParaRPr>
+                    </a:p>
+                  </a:txBody>
+                  <a:tcPr anchor="t" marL="90000" marR="90000">
+                    <a:lnL w="720">
+                      <a:solidFill>
+                        <a:srgbClr val="ffffff"/>
+                      </a:solidFill>
+                    </a:lnL>
+                    <a:lnR w="720">
+                      <a:solidFill>
+                        <a:srgbClr val="ffffff"/>
+                      </a:solidFill>
+                    </a:lnR>
+                    <a:lnT w="720">
+                      <a:solidFill>
+                        <a:srgbClr val="ffffff"/>
+                      </a:solidFill>
+                    </a:lnT>
+                    <a:lnB w="720">
+                      <a:solidFill>
+                        <a:srgbClr val="ffffff"/>
+                      </a:solidFill>
+                    </a:lnB>
+                    <a:solidFill>
+                      <a:srgbClr val="e6e6e6"/>
+                    </a:solidFill>
+                  </a:tcPr>
+                </a:tc>
+                <a:tc>
+                  <a:txBody>
+                    <a:bodyPr lIns="90000" rIns="90000" tIns="46800" bIns="46800" anchor="t">
+                      <a:noAutofit/>
+                    </a:bodyPr>
+                    <a:p>
+                      <a:r>
+                        <a:rPr b="0" lang="en-IN" sz="1800" spc="-1" strike="noStrike">
+                          <a:latin typeface="Arial"/>
+                        </a:rPr>
+                        <a:t>Dummy 3,3</a:t>
+                      </a:r>
+                      <a:endParaRPr b="0" lang="en-IN" sz="1800" spc="-1" strike="noStrike">
+                        <a:latin typeface="Arial"/>
+                      </a:endParaRPr>
+                    </a:p>
+                  </a:txBody>
+                  <a:tcPr anchor="t" marL="90000" marR="90000">
+                    <a:lnL w="720">
+                      <a:solidFill>
+                        <a:srgbClr val="ffffff"/>
+                      </a:solidFill>
+                    </a:lnL>
+                    <a:lnR w="720">
+                      <a:solidFill>
+                        <a:srgbClr val="ffffff"/>
+                      </a:solidFill>
+                    </a:lnR>
+                    <a:lnT w="720">
+                      <a:solidFill>
+                        <a:srgbClr val="ffffff"/>
+                      </a:solidFill>
+                    </a:lnT>
+                    <a:lnB w="720">
+                      <a:solidFill>
+                        <a:srgbClr val="ffffff"/>
+                      </a:solidFill>
+                    </a:lnB>
+                    <a:solidFill>
+                      <a:srgbClr val="e6e6e6"/>
+                    </a:solidFill>
+                  </a:tcPr>
+                </a:tc>
+              </a:tr>
+            </a:tbl>
+          </a:graphicData>
+        </a:graphic>
+      </p:graphicFrame>
     </p:spTree>
   </p:cSld>
   <mc:AlternateContent>
@@ -6312,7 +6028,7 @@
         <p:spPr>
           <a:xfrm>
             <a:off x="834480" y="1766520"/>
-            <a:ext cx="9783000" cy="2649240"/>
+            <a:ext cx="9782640" cy="2649240"/>
           </a:xfrm>
           <a:prstGeom prst="rect">
             <a:avLst/>
@@ -6349,6 +6065,7 @@
                   <a:srgbClr val="000000"/>
                 </a:solidFill>
                 <a:latin typeface="urw-din"/>
+                <a:ea typeface="DejaVu Sans"/>
               </a:rPr>
               <a:t>It can be used to find files and directories and perform subsequent operations on them. </a:t>
             </a:r>
@@ -6384,6 +6101,7 @@
                   <a:srgbClr val="000000"/>
                 </a:solidFill>
                 <a:latin typeface="urw-din"/>
+                <a:ea typeface="DejaVu Sans"/>
               </a:rPr>
               <a:t>It supports searching by file, folder, name, creation date, modification date, owner and permissions. </a:t>
             </a:r>
@@ -6413,7 +6131,7 @@
         <p:spPr>
           <a:xfrm>
             <a:off x="982440" y="690120"/>
-            <a:ext cx="9143640" cy="880920"/>
+            <a:ext cx="9143280" cy="880560"/>
           </a:xfrm>
           <a:prstGeom prst="rect">
             <a:avLst/>
@@ -6446,6 +6164,7 @@
                   <a:srgbClr val="000000"/>
                 </a:solidFill>
                 <a:latin typeface="Times New Roman"/>
+                <a:ea typeface="DejaVu Sans"/>
               </a:rPr>
               <a:t>find command</a:t>
             </a:r>
@@ -6494,7 +6213,7 @@
         <p:spPr>
           <a:xfrm>
             <a:off x="834480" y="1766520"/>
-            <a:ext cx="9783000" cy="3075840"/>
+            <a:ext cx="9782640" cy="3075840"/>
           </a:xfrm>
           <a:prstGeom prst="rect">
             <a:avLst/>
@@ -6527,6 +6246,7 @@
                   <a:srgbClr val="000000"/>
                 </a:solidFill>
                 <a:latin typeface="urw-din"/>
+                <a:ea typeface="DejaVu Sans"/>
               </a:rPr>
               <a:t>Syntax :</a:t>
             </a:r>
@@ -6558,6 +6278,7 @@
                   <a:srgbClr val="000000"/>
                 </a:solidFill>
                 <a:latin typeface="urw-din"/>
+                <a:ea typeface="DejaVu Sans"/>
               </a:rPr>
               <a:t>$ find [where to start searching from]  [expression determines what to find] </a:t>
             </a:r>
@@ -6589,6 +6310,7 @@
                   <a:srgbClr val="000000"/>
                 </a:solidFill>
                 <a:latin typeface="urw-din"/>
+                <a:ea typeface="DejaVu Sans"/>
               </a:rPr>
               <a:t>What to find is divided into: </a:t>
             </a:r>
@@ -6609,6 +6331,7 @@
                   <a:srgbClr val="000000"/>
                 </a:solidFill>
                 <a:latin typeface="urw-din"/>
+                <a:ea typeface="DejaVu Sans"/>
               </a:rPr>
               <a:t>          </a:t>
             </a:r>
@@ -6618,6 +6341,7 @@
                   <a:srgbClr val="000000"/>
                 </a:solidFill>
                 <a:latin typeface="urw-din"/>
+                <a:ea typeface="DejaVu Sans"/>
               </a:rPr>
               <a:t>[-options]     [what to find]</a:t>
             </a:r>
@@ -6636,7 +6360,7 @@
         <p:spPr>
           <a:xfrm>
             <a:off x="982440" y="690120"/>
-            <a:ext cx="9143640" cy="880920"/>
+            <a:ext cx="9143280" cy="880560"/>
           </a:xfrm>
           <a:prstGeom prst="rect">
             <a:avLst/>
@@ -6669,6 +6393,7 @@
                   <a:srgbClr val="000000"/>
                 </a:solidFill>
                 <a:latin typeface="Times New Roman"/>
+                <a:ea typeface="DejaVu Sans"/>
               </a:rPr>
               <a:t>find command</a:t>
             </a:r>
@@ -6717,7 +6442,7 @@
         <p:spPr>
           <a:xfrm>
             <a:off x="834480" y="1766520"/>
-            <a:ext cx="9783000" cy="1796040"/>
+            <a:ext cx="9782640" cy="1796040"/>
           </a:xfrm>
           <a:prstGeom prst="rect">
             <a:avLst/>
@@ -6750,6 +6475,7 @@
                   <a:srgbClr val="000000"/>
                 </a:solidFill>
                 <a:latin typeface="urw-din"/>
+                <a:ea typeface="DejaVu Sans"/>
               </a:rPr>
               <a:t>Example: find a file named passwd in /etc directory</a:t>
             </a:r>
@@ -6792,6 +6518,7 @@
                   <a:srgbClr val="000000"/>
                 </a:solidFill>
                 <a:latin typeface="urw-din"/>
+                <a:ea typeface="DejaVu Sans"/>
               </a:rPr>
               <a:t>      </a:t>
             </a:r>
@@ -6801,6 +6528,7 @@
                   <a:srgbClr val="000000"/>
                 </a:solidFill>
                 <a:latin typeface="urw-din"/>
+                <a:ea typeface="DejaVu Sans"/>
               </a:rPr>
               <a:t>find /etc  -name passwd  -type f</a:t>
             </a:r>
@@ -6819,7 +6547,7 @@
         <p:spPr>
           <a:xfrm>
             <a:off x="982440" y="690120"/>
-            <a:ext cx="9143640" cy="880920"/>
+            <a:ext cx="9143280" cy="880560"/>
           </a:xfrm>
           <a:prstGeom prst="rect">
             <a:avLst/>
@@ -6852,6 +6580,7 @@
                   <a:srgbClr val="000000"/>
                 </a:solidFill>
                 <a:latin typeface="Times New Roman"/>
+                <a:ea typeface="DejaVu Sans"/>
               </a:rPr>
               <a:t>find command</a:t>
             </a:r>
@@ -6900,7 +6629,7 @@
         <p:spPr>
           <a:xfrm>
             <a:off x="982440" y="690120"/>
-            <a:ext cx="9143640" cy="880920"/>
+            <a:ext cx="9143280" cy="880560"/>
           </a:xfrm>
           <a:prstGeom prst="rect">
             <a:avLst/>
@@ -6933,6 +6662,7 @@
                   <a:srgbClr val="000000"/>
                 </a:solidFill>
                 <a:latin typeface="Calibri"/>
+                <a:ea typeface="DejaVu Sans"/>
               </a:rPr>
               <a:t>find command Options :</a:t>
             </a:r>
@@ -6962,7 +6692,7 @@
         <p:spPr>
           <a:xfrm>
             <a:off x="801360" y="1571400"/>
-            <a:ext cx="11041200" cy="3502440"/>
+            <a:ext cx="11040840" cy="3502440"/>
           </a:xfrm>
           <a:prstGeom prst="rect">
             <a:avLst/>
@@ -6995,6 +6725,7 @@
                   <a:srgbClr val="000000"/>
                 </a:solidFill>
                 <a:latin typeface="Calibri"/>
+                <a:ea typeface="DejaVu Sans"/>
               </a:rPr>
               <a:t>-name demo : </a:t>
             </a:r>
@@ -7004,6 +6735,7 @@
                   <a:srgbClr val="000000"/>
                 </a:solidFill>
                 <a:latin typeface="Calibri"/>
+                <a:ea typeface="DejaVu Sans"/>
               </a:rPr>
               <a:t>Search for files that are specified by ‘demo’.</a:t>
             </a:r>
@@ -7035,6 +6767,7 @@
                   <a:srgbClr val="000000"/>
                 </a:solidFill>
                 <a:latin typeface="Calibri"/>
+                <a:ea typeface="DejaVu Sans"/>
               </a:rPr>
               <a:t>-perm octal : </a:t>
             </a:r>
@@ -7044,6 +6777,7 @@
                   <a:srgbClr val="000000"/>
                 </a:solidFill>
                 <a:latin typeface="Calibri"/>
+                <a:ea typeface="DejaVu Sans"/>
               </a:rPr>
               <a:t>Search for the file if permission is ‘octal’.</a:t>
             </a:r>
@@ -7075,6 +6809,7 @@
                   <a:srgbClr val="000000"/>
                 </a:solidFill>
                 <a:latin typeface="Calibri"/>
+                <a:ea typeface="DejaVu Sans"/>
               </a:rPr>
               <a:t>-print : </a:t>
             </a:r>
@@ -7084,6 +6819,7 @@
                   <a:srgbClr val="000000"/>
                 </a:solidFill>
                 <a:latin typeface="Calibri"/>
+                <a:ea typeface="DejaVu Sans"/>
               </a:rPr>
               <a:t>Display the path name of the files found by using the rest of the criteria.</a:t>
             </a:r>
@@ -7115,6 +6851,7 @@
                   <a:srgbClr val="000000"/>
                 </a:solidFill>
                 <a:latin typeface="Calibri"/>
+                <a:ea typeface="DejaVu Sans"/>
               </a:rPr>
               <a:t>-type:   search by type (f for file and d for directory)</a:t>
             </a:r>
@@ -7163,7 +6900,7 @@
         <p:spPr>
           <a:xfrm>
             <a:off x="982440" y="690120"/>
-            <a:ext cx="9143640" cy="880920"/>
+            <a:ext cx="9143280" cy="880560"/>
           </a:xfrm>
           <a:prstGeom prst="rect">
             <a:avLst/>
@@ -7196,6 +6933,7 @@
                   <a:srgbClr val="000000"/>
                 </a:solidFill>
                 <a:latin typeface="Calibri"/>
+                <a:ea typeface="DejaVu Sans"/>
               </a:rPr>
               <a:t>find command Options :</a:t>
             </a:r>
@@ -7225,7 +6963,7 @@
         <p:spPr>
           <a:xfrm>
             <a:off x="801360" y="1571400"/>
-            <a:ext cx="11041200" cy="6001200"/>
+            <a:ext cx="11040840" cy="6001200"/>
           </a:xfrm>
           <a:prstGeom prst="rect">
             <a:avLst/>
@@ -7258,6 +6996,7 @@
                   <a:srgbClr val="000000"/>
                 </a:solidFill>
                 <a:latin typeface="Calibri"/>
+                <a:ea typeface="DejaVu Sans"/>
               </a:rPr>
               <a:t>-empty : </a:t>
             </a:r>
@@ -7267,6 +7006,7 @@
                   <a:srgbClr val="000000"/>
                 </a:solidFill>
                 <a:latin typeface="Calibri"/>
+                <a:ea typeface="DejaVu Sans"/>
               </a:rPr>
               <a:t>Search for empty files and directories.</a:t>
             </a:r>
@@ -7298,6 +7038,7 @@
                   <a:srgbClr val="000000"/>
                 </a:solidFill>
                 <a:latin typeface="Calibri"/>
+                <a:ea typeface="DejaVu Sans"/>
               </a:rPr>
               <a:t>-size +N/-N : </a:t>
             </a:r>
@@ -7307,6 +7048,7 @@
                   <a:srgbClr val="000000"/>
                 </a:solidFill>
                 <a:latin typeface="Calibri"/>
+                <a:ea typeface="DejaVu Sans"/>
               </a:rPr>
               <a:t>Search for files of ‘N’ blocks; ‘N’ followed by ‘c’can be used to measure size in characters; ‘+N’ means size &gt; ‘N’ blocks and ‘-N’ means size &lt; 'N' blocks.</a:t>
             </a:r>
@@ -7338,6 +7080,7 @@
                   <a:srgbClr val="000000"/>
                 </a:solidFill>
                 <a:latin typeface="Calibri"/>
+                <a:ea typeface="DejaVu Sans"/>
               </a:rPr>
               <a:t>-user name : </a:t>
             </a:r>
@@ -7347,6 +7090,7 @@
                   <a:srgbClr val="000000"/>
                 </a:solidFill>
                 <a:latin typeface="Calibri"/>
+                <a:ea typeface="DejaVu Sans"/>
               </a:rPr>
               <a:t>Search for files owned by user name or ID ‘name’.</a:t>
             </a:r>
@@ -7378,6 +7122,7 @@
                   <a:srgbClr val="000000"/>
                 </a:solidFill>
                 <a:latin typeface="Calibri"/>
+                <a:ea typeface="DejaVu Sans"/>
               </a:rPr>
               <a:t>-exec CMD: </a:t>
             </a:r>
@@ -7387,6 +7132,7 @@
                   <a:srgbClr val="000000"/>
                 </a:solidFill>
                 <a:latin typeface="Calibri"/>
+                <a:ea typeface="DejaVu Sans"/>
               </a:rPr>
               <a:t>The file being searched which meets the above criteria and returns 0 for as its exit status for successful command execution.</a:t>
             </a:r>
@@ -7407,6 +7153,7 @@
                   <a:srgbClr val="ff0000"/>
                 </a:solidFill>
                 <a:latin typeface="Calibri"/>
+                <a:ea typeface="DejaVu Sans"/>
               </a:rPr>
               <a:t> </a:t>
             </a:r>
@@ -7416,6 +7163,7 @@
                   <a:srgbClr val="ff0000"/>
                 </a:solidFill>
                 <a:latin typeface="Calibri"/>
+                <a:ea typeface="DejaVu Sans"/>
               </a:rPr>
               <a:t>find /etc –name passwd -exec cp {} abc.txt \;</a:t>
             </a:r>
@@ -7475,7 +7223,7 @@
         <p:spPr>
           <a:xfrm>
             <a:off x="834480" y="1766520"/>
-            <a:ext cx="9783000" cy="522720"/>
+            <a:ext cx="9782640" cy="522360"/>
           </a:xfrm>
           <a:prstGeom prst="rect">
             <a:avLst/>
@@ -7501,7 +7249,7 @@
         <p:spPr>
           <a:xfrm>
             <a:off x="982440" y="690120"/>
-            <a:ext cx="9143640" cy="880920"/>
+            <a:ext cx="9143280" cy="880560"/>
           </a:xfrm>
           <a:prstGeom prst="rect">
             <a:avLst/>
@@ -7534,6 +7282,7 @@
                   <a:srgbClr val="000000"/>
                 </a:solidFill>
                 <a:latin typeface="Times New Roman"/>
+                <a:ea typeface="DejaVu Sans"/>
               </a:rPr>
               <a:t>find command</a:t>
             </a:r>
@@ -7552,7 +7301,7 @@
         <p:spPr>
           <a:xfrm>
             <a:off x="676800" y="1551240"/>
-            <a:ext cx="11041200" cy="3929040"/>
+            <a:ext cx="11040840" cy="3929040"/>
           </a:xfrm>
           <a:prstGeom prst="rect">
             <a:avLst/>
@@ -7585,6 +7334,7 @@
                   <a:srgbClr val="000000"/>
                 </a:solidFill>
                 <a:latin typeface="Calibri"/>
+                <a:ea typeface="DejaVu Sans"/>
               </a:rPr>
               <a:t>1. Search a file with specific name.</a:t>
             </a:r>
@@ -7616,6 +7366,7 @@
                   <a:srgbClr val="000000"/>
                 </a:solidFill>
                 <a:latin typeface="Calibri"/>
+                <a:ea typeface="DejaVu Sans"/>
               </a:rPr>
               <a:t>$ find /etc -name passwd </a:t>
             </a:r>
@@ -7647,6 +7398,7 @@
                   <a:srgbClr val="000000"/>
                 </a:solidFill>
                 <a:latin typeface="Calibri"/>
+                <a:ea typeface="DejaVu Sans"/>
               </a:rPr>
               <a:t>2. Search a file with pattern.</a:t>
             </a:r>
@@ -7678,6 +7430,7 @@
                   <a:srgbClr val="000000"/>
                 </a:solidFill>
                 <a:latin typeface="Calibri"/>
+                <a:ea typeface="DejaVu Sans"/>
               </a:rPr>
               <a:t>$ find /navjot -name *.txt </a:t>
             </a:r>
@@ -7698,6 +7451,7 @@
                   <a:srgbClr val="000000"/>
                 </a:solidFill>
                 <a:latin typeface="Calibri"/>
+                <a:ea typeface="DejaVu Sans"/>
               </a:rPr>
               <a:t>It will give all files which have ‘.txt’ at the end.</a:t>
             </a:r>
@@ -7757,7 +7511,7 @@
         <p:spPr>
           <a:xfrm>
             <a:off x="834480" y="1766520"/>
-            <a:ext cx="9783000" cy="522720"/>
+            <a:ext cx="9782640" cy="522360"/>
           </a:xfrm>
           <a:prstGeom prst="rect">
             <a:avLst/>
@@ -7783,7 +7537,7 @@
         <p:spPr>
           <a:xfrm>
             <a:off x="982440" y="690120"/>
-            <a:ext cx="9143640" cy="880920"/>
+            <a:ext cx="9143280" cy="880560"/>
           </a:xfrm>
           <a:prstGeom prst="rect">
             <a:avLst/>
@@ -7816,6 +7570,7 @@
                   <a:srgbClr val="000000"/>
                 </a:solidFill>
                 <a:latin typeface="Times New Roman"/>
+                <a:ea typeface="DejaVu Sans"/>
               </a:rPr>
               <a:t>find command</a:t>
             </a:r>
@@ -7834,7 +7589,7 @@
         <p:spPr>
           <a:xfrm>
             <a:off x="676800" y="1551240"/>
-            <a:ext cx="11041200" cy="5635440"/>
+            <a:ext cx="11040840" cy="5635440"/>
           </a:xfrm>
           <a:prstGeom prst="rect">
             <a:avLst/>
@@ -7867,6 +7622,7 @@
                   <a:srgbClr val="000000"/>
                 </a:solidFill>
                 <a:latin typeface="Calibri"/>
+                <a:ea typeface="DejaVu Sans"/>
               </a:rPr>
               <a:t>3. How to find and delete a file with confirmation.</a:t>
             </a:r>
@@ -7898,6 +7654,7 @@
                   <a:srgbClr val="000000"/>
                 </a:solidFill>
                 <a:latin typeface="Calibri"/>
+                <a:ea typeface="DejaVu Sans"/>
               </a:rPr>
               <a:t>$ find / -name sample.txt -exec rm -i {} \; </a:t>
             </a:r>
@@ -7918,6 +7675,7 @@
                   <a:srgbClr val="000000"/>
                 </a:solidFill>
                 <a:latin typeface="Calibri"/>
+                <a:ea typeface="DejaVu Sans"/>
               </a:rPr>
               <a:t>When this command is entered, a prompt will come for confirmation, if you want to delete sample.txt or not. if you enter ‘Y/y’ it will delete the file.</a:t>
             </a:r>
@@ -7949,6 +7707,7 @@
                   <a:srgbClr val="000000"/>
                 </a:solidFill>
                 <a:latin typeface="Calibri"/>
+                <a:ea typeface="DejaVu Sans"/>
               </a:rPr>
               <a:t>4. Search for empty files and directories.</a:t>
             </a:r>
@@ -7980,6 +7739,7 @@
                   <a:srgbClr val="000000"/>
                 </a:solidFill>
                 <a:latin typeface="Calibri"/>
+                <a:ea typeface="DejaVu Sans"/>
               </a:rPr>
               <a:t>$ find /etc -empty</a:t>
             </a:r>
@@ -8000,6 +7760,7 @@
                   <a:srgbClr val="000000"/>
                 </a:solidFill>
                 <a:latin typeface="Calibri"/>
+                <a:ea typeface="DejaVu Sans"/>
               </a:rPr>
               <a:t>This command find all empty folders and files in the entered directory or sub-directories.</a:t>
             </a:r>
@@ -8059,7 +7820,7 @@
         <p:spPr>
           <a:xfrm>
             <a:off x="834480" y="1766520"/>
-            <a:ext cx="9783000" cy="522720"/>
+            <a:ext cx="9782640" cy="522360"/>
           </a:xfrm>
           <a:prstGeom prst="rect">
             <a:avLst/>
@@ -8085,7 +7846,7 @@
         <p:spPr>
           <a:xfrm>
             <a:off x="982440" y="690120"/>
-            <a:ext cx="9143640" cy="880920"/>
+            <a:ext cx="9143280" cy="880560"/>
           </a:xfrm>
           <a:prstGeom prst="rect">
             <a:avLst/>
@@ -8118,6 +7879,7 @@
                   <a:srgbClr val="000000"/>
                 </a:solidFill>
                 <a:latin typeface="Times New Roman"/>
+                <a:ea typeface="DejaVu Sans"/>
               </a:rPr>
               <a:t>find command</a:t>
             </a:r>
@@ -8136,7 +7898,7 @@
         <p:spPr>
           <a:xfrm>
             <a:off x="676800" y="1551240"/>
-            <a:ext cx="11041200" cy="4113000"/>
+            <a:ext cx="11040840" cy="4113000"/>
           </a:xfrm>
           <a:prstGeom prst="rect">
             <a:avLst/>
@@ -8169,6 +7931,7 @@
                   <a:srgbClr val="000000"/>
                 </a:solidFill>
                 <a:latin typeface="Calibri"/>
+                <a:ea typeface="DejaVu Sans"/>
               </a:rPr>
               <a:t>5. Search for file with entered permissions.</a:t>
             </a:r>
@@ -8200,6 +7963,7 @@
                   <a:srgbClr val="000000"/>
                 </a:solidFill>
                 <a:latin typeface="Calibri"/>
+                <a:ea typeface="DejaVu Sans"/>
               </a:rPr>
               <a:t>$ find /etc -perm 664</a:t>
             </a:r>
@@ -8220,6 +7984,7 @@
                   <a:srgbClr val="000000"/>
                 </a:solidFill>
                 <a:latin typeface="Calibri"/>
+                <a:ea typeface="DejaVu Sans"/>
               </a:rPr>
               <a:t>This command find all the files in the /etc directory or sub-directory with the given permissions.</a:t>
             </a:r>
@@ -8251,6 +8016,7 @@
                   <a:srgbClr val="000000"/>
                 </a:solidFill>
                 <a:latin typeface="Calibri"/>
+                <a:ea typeface="DejaVu Sans"/>
               </a:rPr>
               <a:t>6. Search text within multiple files.</a:t>
             </a:r>
@@ -8282,6 +8048,7 @@
                   <a:srgbClr val="000000"/>
                 </a:solidFill>
                 <a:latin typeface="Calibri"/>
+                <a:ea typeface="DejaVu Sans"/>
               </a:rPr>
               <a:t>$ find / -type f -name "*.txt" -exec grep 'user'  {} \;</a:t>
             </a:r>
@@ -8302,6 +8069,7 @@
                   <a:srgbClr val="000000"/>
                 </a:solidFill>
                 <a:latin typeface="Calibri"/>
+                <a:ea typeface="DejaVu Sans"/>
               </a:rPr>
               <a:t>This command print lines which have ‘user’ in them and ‘-type f’ specifies the input type is a file.</a:t>
             </a:r>

</xml_diff>